<commit_message>
Final presentation on Modelica Conference 2023
</commit_message>
<xml_diff>
--- a/Physiolibrary/Resources/Documentation/Physiolibrary v3.0.pptx
+++ b/Physiolibrary/Resources/Documentation/Physiolibrary v3.0.pptx
@@ -23,13 +23,23 @@
     <p:sldId id="288" r:id="rId17"/>
     <p:sldId id="287" r:id="rId18"/>
     <p:sldId id="286" r:id="rId19"/>
-    <p:sldId id="300" r:id="rId20"/>
-    <p:sldId id="305" r:id="rId21"/>
-    <p:sldId id="301" r:id="rId22"/>
-    <p:sldId id="302" r:id="rId23"/>
-    <p:sldId id="303" r:id="rId24"/>
-    <p:sldId id="304" r:id="rId25"/>
-    <p:sldId id="276" r:id="rId26"/>
+    <p:sldId id="307" r:id="rId20"/>
+    <p:sldId id="309" r:id="rId21"/>
+    <p:sldId id="308" r:id="rId22"/>
+    <p:sldId id="310" r:id="rId23"/>
+    <p:sldId id="306" r:id="rId24"/>
+    <p:sldId id="300" r:id="rId25"/>
+    <p:sldId id="305" r:id="rId26"/>
+    <p:sldId id="302" r:id="rId27"/>
+    <p:sldId id="303" r:id="rId28"/>
+    <p:sldId id="311" r:id="rId29"/>
+    <p:sldId id="301" r:id="rId30"/>
+    <p:sldId id="304" r:id="rId31"/>
+    <p:sldId id="313" r:id="rId32"/>
+    <p:sldId id="316" r:id="rId33"/>
+    <p:sldId id="315" r:id="rId34"/>
+    <p:sldId id="314" r:id="rId35"/>
+    <p:sldId id="276" r:id="rId36"/>
   </p:sldIdLst>
   <p:sldSz cx="9144000" cy="6858000" type="screen4x3"/>
   <p:notesSz cx="6858000" cy="9144000"/>
@@ -327,7 +337,7 @@
             <a:fld id="{18A2481B-5154-415F-B752-558547769AA3}" type="datetimeFigureOut">
               <a:rPr lang="cs-CZ" smtClean="0"/>
               <a:pPr/>
-              <a:t>04.10.2023</a:t>
+              <a:t>09.10.2023</a:t>
             </a:fld>
             <a:endParaRPr lang="cs-CZ"/>
           </a:p>
@@ -492,7 +502,7 @@
             <a:fld id="{18A2481B-5154-415F-B752-558547769AA3}" type="datetimeFigureOut">
               <a:rPr lang="cs-CZ" smtClean="0"/>
               <a:pPr/>
-              <a:t>04.10.2023</a:t>
+              <a:t>09.10.2023</a:t>
             </a:fld>
             <a:endParaRPr lang="cs-CZ"/>
           </a:p>
@@ -667,7 +677,7 @@
             <a:fld id="{18A2481B-5154-415F-B752-558547769AA3}" type="datetimeFigureOut">
               <a:rPr lang="cs-CZ" smtClean="0"/>
               <a:pPr/>
-              <a:t>04.10.2023</a:t>
+              <a:t>09.10.2023</a:t>
             </a:fld>
             <a:endParaRPr lang="cs-CZ"/>
           </a:p>
@@ -832,7 +842,7 @@
             <a:fld id="{18A2481B-5154-415F-B752-558547769AA3}" type="datetimeFigureOut">
               <a:rPr lang="cs-CZ" smtClean="0"/>
               <a:pPr/>
-              <a:t>04.10.2023</a:t>
+              <a:t>09.10.2023</a:t>
             </a:fld>
             <a:endParaRPr lang="cs-CZ"/>
           </a:p>
@@ -1074,7 +1084,7 @@
             <a:fld id="{18A2481B-5154-415F-B752-558547769AA3}" type="datetimeFigureOut">
               <a:rPr lang="cs-CZ" smtClean="0"/>
               <a:pPr/>
-              <a:t>04.10.2023</a:t>
+              <a:t>09.10.2023</a:t>
             </a:fld>
             <a:endParaRPr lang="cs-CZ"/>
           </a:p>
@@ -1356,7 +1366,7 @@
             <a:fld id="{18A2481B-5154-415F-B752-558547769AA3}" type="datetimeFigureOut">
               <a:rPr lang="cs-CZ" smtClean="0"/>
               <a:pPr/>
-              <a:t>04.10.2023</a:t>
+              <a:t>09.10.2023</a:t>
             </a:fld>
             <a:endParaRPr lang="cs-CZ"/>
           </a:p>
@@ -1772,7 +1782,7 @@
             <a:fld id="{18A2481B-5154-415F-B752-558547769AA3}" type="datetimeFigureOut">
               <a:rPr lang="cs-CZ" smtClean="0"/>
               <a:pPr/>
-              <a:t>04.10.2023</a:t>
+              <a:t>09.10.2023</a:t>
             </a:fld>
             <a:endParaRPr lang="cs-CZ"/>
           </a:p>
@@ -1886,7 +1896,7 @@
             <a:fld id="{18A2481B-5154-415F-B752-558547769AA3}" type="datetimeFigureOut">
               <a:rPr lang="cs-CZ" smtClean="0"/>
               <a:pPr/>
-              <a:t>04.10.2023</a:t>
+              <a:t>09.10.2023</a:t>
             </a:fld>
             <a:endParaRPr lang="cs-CZ"/>
           </a:p>
@@ -1978,7 +1988,7 @@
             <a:fld id="{18A2481B-5154-415F-B752-558547769AA3}" type="datetimeFigureOut">
               <a:rPr lang="cs-CZ" smtClean="0"/>
               <a:pPr/>
-              <a:t>04.10.2023</a:t>
+              <a:t>09.10.2023</a:t>
             </a:fld>
             <a:endParaRPr lang="cs-CZ"/>
           </a:p>
@@ -2250,7 +2260,7 @@
             <a:fld id="{18A2481B-5154-415F-B752-558547769AA3}" type="datetimeFigureOut">
               <a:rPr lang="cs-CZ" smtClean="0"/>
               <a:pPr/>
-              <a:t>04.10.2023</a:t>
+              <a:t>09.10.2023</a:t>
             </a:fld>
             <a:endParaRPr lang="cs-CZ"/>
           </a:p>
@@ -2499,7 +2509,7 @@
             <a:fld id="{18A2481B-5154-415F-B752-558547769AA3}" type="datetimeFigureOut">
               <a:rPr lang="cs-CZ" smtClean="0"/>
               <a:pPr/>
-              <a:t>04.10.2023</a:t>
+              <a:t>09.10.2023</a:t>
             </a:fld>
             <a:endParaRPr lang="cs-CZ"/>
           </a:p>
@@ -2707,7 +2717,7 @@
             <a:fld id="{18A2481B-5154-415F-B752-558547769AA3}" type="datetimeFigureOut">
               <a:rPr lang="cs-CZ" smtClean="0"/>
               <a:pPr/>
-              <a:t>04.10.2023</a:t>
+              <a:t>09.10.2023</a:t>
             </a:fld>
             <a:endParaRPr lang="cs-CZ"/>
           </a:p>
@@ -4081,7 +4091,7 @@
 </file>
 
 <file path=ppt/slides/slide19.xml><?xml version="1.0" encoding="utf-8"?>
-<p:sld xmlns:a="http://schemas.openxmlformats.org/drawingml/2006/main" xmlns:r="http://schemas.openxmlformats.org/officeDocument/2006/relationships" xmlns:p="http://schemas.openxmlformats.org/presentationml/2006/main">
+<p:sld xmlns:a="http://schemas.openxmlformats.org/drawingml/2006/main" xmlns:r="http://schemas.openxmlformats.org/officeDocument/2006/relationships" xmlns:p="http://schemas.openxmlformats.org/presentationml/2006/main" show="0">
   <p:cSld>
     <p:spTree>
       <p:nvGrpSpPr>
@@ -4097,19 +4107,55 @@
           <a:chExt cx="0" cy="0"/>
         </a:xfrm>
       </p:grpSpPr>
+      <p:sp>
+        <p:nvSpPr>
+          <p:cNvPr id="2" name="Title 1">
+            <a:extLst>
+              <a:ext uri="{FF2B5EF4-FFF2-40B4-BE49-F238E27FC236}">
+                <a16:creationId xmlns:a16="http://schemas.microsoft.com/office/drawing/2014/main" id="{794778C9-1E50-4C8C-A5BE-C16EBA371BE2}"/>
+              </a:ext>
+            </a:extLst>
+          </p:cNvPr>
+          <p:cNvSpPr>
+            <a:spLocks noGrp="1"/>
+          </p:cNvSpPr>
+          <p:nvPr>
+            <p:ph type="title"/>
+          </p:nvPr>
+        </p:nvSpPr>
+        <p:spPr>
+          <a:xfrm>
+            <a:off x="552127" y="35188"/>
+            <a:ext cx="8229600" cy="1143000"/>
+          </a:xfrm>
+        </p:spPr>
+        <p:txBody>
+          <a:bodyPr/>
+          <a:lstStyle/>
+          <a:p>
+            <a:r>
+              <a:rPr lang="en-US" dirty="0"/>
+              <a:t>Hemoglobin oxygen saturation</a:t>
+            </a:r>
+            <a:endParaRPr lang="cs-CZ" dirty="0"/>
+          </a:p>
+        </p:txBody>
+      </p:sp>
       <p:pic>
         <p:nvPicPr>
-          <p:cNvPr id="9" name="Picture 8">
-            <a:extLst>
-              <a:ext uri="{FF2B5EF4-FFF2-40B4-BE49-F238E27FC236}">
-                <a16:creationId xmlns:a16="http://schemas.microsoft.com/office/drawing/2014/main" id="{B9C8BDFA-C775-4FCD-8C33-B5D7BCB7F1CC}"/>
+          <p:cNvPr id="5" name="Content Placeholder 4">
+            <a:extLst>
+              <a:ext uri="{FF2B5EF4-FFF2-40B4-BE49-F238E27FC236}">
+                <a16:creationId xmlns:a16="http://schemas.microsoft.com/office/drawing/2014/main" id="{1950520B-E636-42B6-95C4-C2BF92B1EFBD}"/>
               </a:ext>
             </a:extLst>
           </p:cNvPr>
           <p:cNvPicPr>
-            <a:picLocks noChangeAspect="1"/>
+            <a:picLocks noGrp="1" noChangeAspect="1"/>
           </p:cNvPicPr>
-          <p:nvPr/>
+          <p:nvPr>
+            <p:ph idx="1"/>
+          </p:nvPr>
         </p:nvPicPr>
         <p:blipFill>
           <a:blip r:embed="rId2">
@@ -4125,18 +4171,263 @@
         </p:blipFill>
         <p:spPr>
           <a:xfrm>
-            <a:off x="0" y="66323"/>
-            <a:ext cx="9144000" cy="6725353"/>
+            <a:off x="1257827" y="980728"/>
+            <a:ext cx="6628346" cy="4525963"/>
+          </a:xfrm>
+        </p:spPr>
+      </p:pic>
+      <p:sp>
+        <p:nvSpPr>
+          <p:cNvPr id="3" name="TextBox 2">
+            <a:extLst>
+              <a:ext uri="{FF2B5EF4-FFF2-40B4-BE49-F238E27FC236}">
+                <a16:creationId xmlns:a16="http://schemas.microsoft.com/office/drawing/2014/main" id="{90F7C773-E943-4BA8-9196-76598C60687C}"/>
+              </a:ext>
+            </a:extLst>
+          </p:cNvPr>
+          <p:cNvSpPr txBox="1"/>
+          <p:nvPr/>
+        </p:nvSpPr>
+        <p:spPr>
+          <a:xfrm>
+            <a:off x="323527" y="5657671"/>
+            <a:ext cx="8686799" cy="1200329"/>
           </a:xfrm>
           <a:prstGeom prst="rect">
             <a:avLst/>
           </a:prstGeom>
+          <a:noFill/>
         </p:spPr>
-      </p:pic>
+        <p:txBody>
+          <a:bodyPr wrap="square" rtlCol="0">
+            <a:spAutoFit/>
+          </a:bodyPr>
+          <a:lstStyle/>
+          <a:p>
+            <a:r>
+              <a:rPr lang="cs-CZ" sz="1800" b="0" i="0" u="none" strike="noStrike" baseline="0" dirty="0">
+                <a:solidFill>
+                  <a:srgbClr val="000000"/>
+                </a:solidFill>
+                <a:latin typeface="Calibri" panose="020F0502020204030204" pitchFamily="34" charset="0"/>
+              </a:rPr>
+              <a:t>Mateják, Marek, Tomáš Kulhánek, and Stanislav Matoušek. 2015. “</a:t>
+            </a:r>
+            <a:r>
+              <a:rPr lang="cs-CZ" sz="1800" b="0" i="0" u="none" strike="noStrike" baseline="0" dirty="0" err="1">
+                <a:solidFill>
+                  <a:srgbClr val="000000"/>
+                </a:solidFill>
+                <a:latin typeface="Calibri" panose="020F0502020204030204" pitchFamily="34" charset="0"/>
+              </a:rPr>
+              <a:t>Adair-Based</a:t>
+            </a:r>
+            <a:r>
+              <a:rPr lang="cs-CZ" sz="1800" b="0" i="0" u="none" strike="noStrike" baseline="0" dirty="0">
+                <a:solidFill>
+                  <a:srgbClr val="000000"/>
+                </a:solidFill>
+                <a:latin typeface="Calibri" panose="020F0502020204030204" pitchFamily="34" charset="0"/>
+              </a:rPr>
+              <a:t> Hemoglobin </a:t>
+            </a:r>
+            <a:r>
+              <a:rPr lang="cs-CZ" sz="1800" b="0" i="0" u="none" strike="noStrike" baseline="0" dirty="0" err="1">
+                <a:solidFill>
+                  <a:srgbClr val="000000"/>
+                </a:solidFill>
+                <a:latin typeface="Calibri" panose="020F0502020204030204" pitchFamily="34" charset="0"/>
+              </a:rPr>
+              <a:t>Equilibrium</a:t>
+            </a:r>
+            <a:r>
+              <a:rPr lang="cs-CZ" sz="1800" b="0" i="0" u="none" strike="noStrike" baseline="0" dirty="0">
+                <a:solidFill>
+                  <a:srgbClr val="000000"/>
+                </a:solidFill>
+                <a:latin typeface="Calibri" panose="020F0502020204030204" pitchFamily="34" charset="0"/>
+              </a:rPr>
+              <a:t> </a:t>
+            </a:r>
+            <a:r>
+              <a:rPr lang="cs-CZ" sz="1800" b="0" i="0" u="none" strike="noStrike" baseline="0" dirty="0" err="1">
+                <a:solidFill>
+                  <a:srgbClr val="000000"/>
+                </a:solidFill>
+                <a:latin typeface="Calibri" panose="020F0502020204030204" pitchFamily="34" charset="0"/>
+              </a:rPr>
+              <a:t>with</a:t>
+            </a:r>
+            <a:r>
+              <a:rPr lang="cs-CZ" sz="1800" b="0" i="0" u="none" strike="noStrike" baseline="0" dirty="0">
+                <a:solidFill>
+                  <a:srgbClr val="000000"/>
+                </a:solidFill>
+                <a:latin typeface="Calibri" panose="020F0502020204030204" pitchFamily="34" charset="0"/>
+              </a:rPr>
+              <a:t> Oxygen, </a:t>
+            </a:r>
+            <a:r>
+              <a:rPr lang="cs-CZ" sz="1800" b="0" i="0" u="none" strike="noStrike" baseline="0" dirty="0" err="1">
+                <a:solidFill>
+                  <a:srgbClr val="000000"/>
+                </a:solidFill>
+                <a:latin typeface="Calibri" panose="020F0502020204030204" pitchFamily="34" charset="0"/>
+              </a:rPr>
+              <a:t>Carbon</a:t>
+            </a:r>
+            <a:r>
+              <a:rPr lang="cs-CZ" sz="1800" b="0" i="0" u="none" strike="noStrike" baseline="0" dirty="0">
+                <a:solidFill>
+                  <a:srgbClr val="000000"/>
+                </a:solidFill>
+                <a:latin typeface="Calibri" panose="020F0502020204030204" pitchFamily="34" charset="0"/>
+              </a:rPr>
+              <a:t> Dioxide and Hydrogen Ion </a:t>
+            </a:r>
+            <a:r>
+              <a:rPr lang="cs-CZ" sz="1800" b="0" i="0" u="none" strike="noStrike" baseline="0" dirty="0" err="1">
+                <a:solidFill>
+                  <a:srgbClr val="000000"/>
+                </a:solidFill>
+                <a:latin typeface="Calibri" panose="020F0502020204030204" pitchFamily="34" charset="0"/>
+              </a:rPr>
+              <a:t>Activity</a:t>
+            </a:r>
+            <a:r>
+              <a:rPr lang="cs-CZ" sz="1800" b="0" i="0" u="none" strike="noStrike" baseline="0" dirty="0">
+                <a:solidFill>
+                  <a:srgbClr val="000000"/>
+                </a:solidFill>
+                <a:latin typeface="Calibri" panose="020F0502020204030204" pitchFamily="34" charset="0"/>
+              </a:rPr>
+              <a:t>.” </a:t>
+            </a:r>
+            <a:r>
+              <a:rPr lang="cs-CZ" sz="1800" b="0" i="1" u="none" strike="noStrike" baseline="0" dirty="0" err="1">
+                <a:solidFill>
+                  <a:srgbClr val="000000"/>
+                </a:solidFill>
+                <a:latin typeface="Calibri" panose="020F0502020204030204" pitchFamily="34" charset="0"/>
+              </a:rPr>
+              <a:t>Scandinavian</a:t>
+            </a:r>
+            <a:r>
+              <a:rPr lang="cs-CZ" sz="1800" b="0" i="1" u="none" strike="noStrike" baseline="0" dirty="0">
+                <a:solidFill>
+                  <a:srgbClr val="000000"/>
+                </a:solidFill>
+                <a:latin typeface="Calibri" panose="020F0502020204030204" pitchFamily="34" charset="0"/>
+              </a:rPr>
+              <a:t> </a:t>
+            </a:r>
+            <a:r>
+              <a:rPr lang="cs-CZ" sz="1800" b="0" i="1" u="none" strike="noStrike" baseline="0" dirty="0" err="1">
+                <a:solidFill>
+                  <a:srgbClr val="000000"/>
+                </a:solidFill>
+                <a:latin typeface="Calibri" panose="020F0502020204030204" pitchFamily="34" charset="0"/>
+              </a:rPr>
+              <a:t>Journal</a:t>
+            </a:r>
+            <a:r>
+              <a:rPr lang="cs-CZ" sz="1800" b="0" i="1" u="none" strike="noStrike" baseline="0" dirty="0">
+                <a:solidFill>
+                  <a:srgbClr val="000000"/>
+                </a:solidFill>
+                <a:latin typeface="Calibri" panose="020F0502020204030204" pitchFamily="34" charset="0"/>
+              </a:rPr>
+              <a:t> </a:t>
+            </a:r>
+            <a:r>
+              <a:rPr lang="cs-CZ" sz="1800" b="0" i="1" u="none" strike="noStrike" baseline="0" dirty="0" err="1">
+                <a:solidFill>
+                  <a:srgbClr val="000000"/>
+                </a:solidFill>
+                <a:latin typeface="Calibri" panose="020F0502020204030204" pitchFamily="34" charset="0"/>
+              </a:rPr>
+              <a:t>of</a:t>
+            </a:r>
+            <a:r>
+              <a:rPr lang="cs-CZ" sz="1800" b="0" i="1" u="none" strike="noStrike" baseline="0" dirty="0">
+                <a:solidFill>
+                  <a:srgbClr val="000000"/>
+                </a:solidFill>
+                <a:latin typeface="Calibri" panose="020F0502020204030204" pitchFamily="34" charset="0"/>
+              </a:rPr>
+              <a:t> </a:t>
+            </a:r>
+            <a:r>
+              <a:rPr lang="cs-CZ" sz="1800" b="0" i="1" u="none" strike="noStrike" baseline="0" dirty="0" err="1">
+                <a:solidFill>
+                  <a:srgbClr val="000000"/>
+                </a:solidFill>
+                <a:latin typeface="Calibri" panose="020F0502020204030204" pitchFamily="34" charset="0"/>
+              </a:rPr>
+              <a:t>Clinical</a:t>
+            </a:r>
+            <a:r>
+              <a:rPr lang="cs-CZ" sz="1800" b="0" i="1" u="none" strike="noStrike" baseline="0" dirty="0">
+                <a:solidFill>
+                  <a:srgbClr val="000000"/>
+                </a:solidFill>
+                <a:latin typeface="Calibri" panose="020F0502020204030204" pitchFamily="34" charset="0"/>
+              </a:rPr>
+              <a:t> &amp; </a:t>
+            </a:r>
+            <a:r>
+              <a:rPr lang="cs-CZ" sz="1800" b="0" i="1" u="none" strike="noStrike" baseline="0" dirty="0" err="1">
+                <a:solidFill>
+                  <a:srgbClr val="000000"/>
+                </a:solidFill>
+                <a:latin typeface="Calibri" panose="020F0502020204030204" pitchFamily="34" charset="0"/>
+              </a:rPr>
+              <a:t>Laboratory</a:t>
+            </a:r>
+            <a:r>
+              <a:rPr lang="cs-CZ" sz="1800" b="0" i="1" u="none" strike="noStrike" baseline="0" dirty="0">
+                <a:solidFill>
+                  <a:srgbClr val="000000"/>
+                </a:solidFill>
+                <a:latin typeface="Calibri" panose="020F0502020204030204" pitchFamily="34" charset="0"/>
+              </a:rPr>
+              <a:t> </a:t>
+            </a:r>
+            <a:r>
+              <a:rPr lang="cs-CZ" sz="1800" b="0" i="1" u="none" strike="noStrike" baseline="0" dirty="0" err="1">
+                <a:solidFill>
+                  <a:srgbClr val="000000"/>
+                </a:solidFill>
+                <a:latin typeface="Calibri" panose="020F0502020204030204" pitchFamily="34" charset="0"/>
+              </a:rPr>
+              <a:t>Investigation</a:t>
+            </a:r>
+            <a:r>
+              <a:rPr lang="cs-CZ" sz="1800" b="0" i="1" u="none" strike="noStrike" baseline="0" dirty="0">
+                <a:solidFill>
+                  <a:srgbClr val="000000"/>
+                </a:solidFill>
+                <a:latin typeface="Calibri" panose="020F0502020204030204" pitchFamily="34" charset="0"/>
+              </a:rPr>
+              <a:t> </a:t>
+            </a:r>
+            <a:r>
+              <a:rPr lang="cs-CZ" sz="1800" b="0" i="0" u="none" strike="noStrike" baseline="0" dirty="0">
+                <a:solidFill>
+                  <a:srgbClr val="000000"/>
+                </a:solidFill>
+                <a:latin typeface="Calibri" panose="020F0502020204030204" pitchFamily="34" charset="0"/>
+              </a:rPr>
+              <a:t>75 (2): 113–20. https://doi.org/10.3109/00365513.2014.984320. </a:t>
+            </a:r>
+            <a:endParaRPr lang="cs-CZ" dirty="0"/>
+          </a:p>
+        </p:txBody>
+      </p:sp>
     </p:spTree>
     <p:extLst>
       <p:ext uri="{BB962C8B-B14F-4D97-AF65-F5344CB8AC3E}">
-        <p14:creationId xmlns:p14="http://schemas.microsoft.com/office/powerpoint/2010/main" val="1984133094"/>
+        <p14:creationId xmlns:p14="http://schemas.microsoft.com/office/powerpoint/2010/main" val="3614074020"/>
       </p:ext>
     </p:extLst>
   </p:cSld>
@@ -4527,7 +4818,2057 @@
 </file>
 
 <file path=ppt/slides/slide20.xml><?xml version="1.0" encoding="utf-8"?>
+<p:sld xmlns:a="http://schemas.openxmlformats.org/drawingml/2006/main" xmlns:r="http://schemas.openxmlformats.org/officeDocument/2006/relationships" xmlns:p="http://schemas.openxmlformats.org/presentationml/2006/main" show="0">
+  <p:cSld>
+    <p:spTree>
+      <p:nvGrpSpPr>
+        <p:cNvPr id="1" name=""/>
+        <p:cNvGrpSpPr/>
+        <p:nvPr/>
+      </p:nvGrpSpPr>
+      <p:grpSpPr>
+        <a:xfrm>
+          <a:off x="0" y="0"/>
+          <a:ext cx="0" cy="0"/>
+          <a:chOff x="0" y="0"/>
+          <a:chExt cx="0" cy="0"/>
+        </a:xfrm>
+      </p:grpSpPr>
+      <p:sp>
+        <p:nvSpPr>
+          <p:cNvPr id="2" name="Title 1">
+            <a:extLst>
+              <a:ext uri="{FF2B5EF4-FFF2-40B4-BE49-F238E27FC236}">
+                <a16:creationId xmlns:a16="http://schemas.microsoft.com/office/drawing/2014/main" id="{7B790D2C-2B24-485F-9811-26FAF440E0FD}"/>
+              </a:ext>
+            </a:extLst>
+          </p:cNvPr>
+          <p:cNvSpPr>
+            <a:spLocks noGrp="1"/>
+          </p:cNvSpPr>
+          <p:nvPr>
+            <p:ph type="title"/>
+          </p:nvPr>
+        </p:nvSpPr>
+        <p:spPr>
+          <a:xfrm>
+            <a:off x="457199" y="188640"/>
+            <a:ext cx="8229600" cy="1143000"/>
+          </a:xfrm>
+        </p:spPr>
+        <p:txBody>
+          <a:bodyPr/>
+          <a:lstStyle/>
+          <a:p>
+            <a:r>
+              <a:rPr lang="en-US" dirty="0"/>
+              <a:t>Hemoglobin Haldane’s effect</a:t>
+            </a:r>
+            <a:endParaRPr lang="cs-CZ" dirty="0"/>
+          </a:p>
+        </p:txBody>
+      </p:sp>
+      <p:pic>
+        <p:nvPicPr>
+          <p:cNvPr id="5" name="Content Placeholder 4">
+            <a:extLst>
+              <a:ext uri="{FF2B5EF4-FFF2-40B4-BE49-F238E27FC236}">
+                <a16:creationId xmlns:a16="http://schemas.microsoft.com/office/drawing/2014/main" id="{CA3B6AEA-23ED-4B15-8F32-A4BF87F31E29}"/>
+              </a:ext>
+            </a:extLst>
+          </p:cNvPr>
+          <p:cNvPicPr>
+            <a:picLocks noGrp="1" noChangeAspect="1"/>
+          </p:cNvPicPr>
+          <p:nvPr>
+            <p:ph idx="1"/>
+          </p:nvPr>
+        </p:nvPicPr>
+        <p:blipFill>
+          <a:blip r:embed="rId2">
+            <a:extLst>
+              <a:ext uri="{28A0092B-C50C-407E-A947-70E740481C1C}">
+                <a14:useLocalDpi xmlns:a14="http://schemas.microsoft.com/office/drawing/2010/main" val="0"/>
+              </a:ext>
+            </a:extLst>
+          </a:blip>
+          <a:stretch>
+            <a:fillRect/>
+          </a:stretch>
+        </p:blipFill>
+        <p:spPr>
+          <a:xfrm>
+            <a:off x="1145734" y="1131708"/>
+            <a:ext cx="6852531" cy="4525963"/>
+          </a:xfrm>
+        </p:spPr>
+      </p:pic>
+      <p:sp>
+        <p:nvSpPr>
+          <p:cNvPr id="4" name="TextBox 3">
+            <a:extLst>
+              <a:ext uri="{FF2B5EF4-FFF2-40B4-BE49-F238E27FC236}">
+                <a16:creationId xmlns:a16="http://schemas.microsoft.com/office/drawing/2014/main" id="{67D10865-6685-4153-865E-9A0C81291B88}"/>
+              </a:ext>
+            </a:extLst>
+          </p:cNvPr>
+          <p:cNvSpPr txBox="1"/>
+          <p:nvPr/>
+        </p:nvSpPr>
+        <p:spPr>
+          <a:xfrm>
+            <a:off x="323527" y="5657671"/>
+            <a:ext cx="8686799" cy="1200329"/>
+          </a:xfrm>
+          <a:prstGeom prst="rect">
+            <a:avLst/>
+          </a:prstGeom>
+          <a:noFill/>
+        </p:spPr>
+        <p:txBody>
+          <a:bodyPr wrap="square" rtlCol="0">
+            <a:spAutoFit/>
+          </a:bodyPr>
+          <a:lstStyle/>
+          <a:p>
+            <a:r>
+              <a:rPr lang="cs-CZ" sz="1800" b="0" i="0" u="none" strike="noStrike" baseline="0" dirty="0">
+                <a:solidFill>
+                  <a:srgbClr val="000000"/>
+                </a:solidFill>
+                <a:latin typeface="Calibri" panose="020F0502020204030204" pitchFamily="34" charset="0"/>
+              </a:rPr>
+              <a:t>Mateják, Marek, Tomáš Kulhánek, and Stanislav Matoušek. 2015. “</a:t>
+            </a:r>
+            <a:r>
+              <a:rPr lang="cs-CZ" sz="1800" b="0" i="0" u="none" strike="noStrike" baseline="0" dirty="0" err="1">
+                <a:solidFill>
+                  <a:srgbClr val="000000"/>
+                </a:solidFill>
+                <a:latin typeface="Calibri" panose="020F0502020204030204" pitchFamily="34" charset="0"/>
+              </a:rPr>
+              <a:t>Adair-Based</a:t>
+            </a:r>
+            <a:r>
+              <a:rPr lang="cs-CZ" sz="1800" b="0" i="0" u="none" strike="noStrike" baseline="0" dirty="0">
+                <a:solidFill>
+                  <a:srgbClr val="000000"/>
+                </a:solidFill>
+                <a:latin typeface="Calibri" panose="020F0502020204030204" pitchFamily="34" charset="0"/>
+              </a:rPr>
+              <a:t> Hemoglobin </a:t>
+            </a:r>
+            <a:r>
+              <a:rPr lang="cs-CZ" sz="1800" b="0" i="0" u="none" strike="noStrike" baseline="0" dirty="0" err="1">
+                <a:solidFill>
+                  <a:srgbClr val="000000"/>
+                </a:solidFill>
+                <a:latin typeface="Calibri" panose="020F0502020204030204" pitchFamily="34" charset="0"/>
+              </a:rPr>
+              <a:t>Equilibrium</a:t>
+            </a:r>
+            <a:r>
+              <a:rPr lang="cs-CZ" sz="1800" b="0" i="0" u="none" strike="noStrike" baseline="0" dirty="0">
+                <a:solidFill>
+                  <a:srgbClr val="000000"/>
+                </a:solidFill>
+                <a:latin typeface="Calibri" panose="020F0502020204030204" pitchFamily="34" charset="0"/>
+              </a:rPr>
+              <a:t> </a:t>
+            </a:r>
+            <a:r>
+              <a:rPr lang="cs-CZ" sz="1800" b="0" i="0" u="none" strike="noStrike" baseline="0" dirty="0" err="1">
+                <a:solidFill>
+                  <a:srgbClr val="000000"/>
+                </a:solidFill>
+                <a:latin typeface="Calibri" panose="020F0502020204030204" pitchFamily="34" charset="0"/>
+              </a:rPr>
+              <a:t>with</a:t>
+            </a:r>
+            <a:r>
+              <a:rPr lang="cs-CZ" sz="1800" b="0" i="0" u="none" strike="noStrike" baseline="0" dirty="0">
+                <a:solidFill>
+                  <a:srgbClr val="000000"/>
+                </a:solidFill>
+                <a:latin typeface="Calibri" panose="020F0502020204030204" pitchFamily="34" charset="0"/>
+              </a:rPr>
+              <a:t> Oxygen, </a:t>
+            </a:r>
+            <a:r>
+              <a:rPr lang="cs-CZ" sz="1800" b="0" i="0" u="none" strike="noStrike" baseline="0" dirty="0" err="1">
+                <a:solidFill>
+                  <a:srgbClr val="000000"/>
+                </a:solidFill>
+                <a:latin typeface="Calibri" panose="020F0502020204030204" pitchFamily="34" charset="0"/>
+              </a:rPr>
+              <a:t>Carbon</a:t>
+            </a:r>
+            <a:r>
+              <a:rPr lang="cs-CZ" sz="1800" b="0" i="0" u="none" strike="noStrike" baseline="0" dirty="0">
+                <a:solidFill>
+                  <a:srgbClr val="000000"/>
+                </a:solidFill>
+                <a:latin typeface="Calibri" panose="020F0502020204030204" pitchFamily="34" charset="0"/>
+              </a:rPr>
+              <a:t> Dioxide and Hydrogen Ion </a:t>
+            </a:r>
+            <a:r>
+              <a:rPr lang="cs-CZ" sz="1800" b="0" i="0" u="none" strike="noStrike" baseline="0" dirty="0" err="1">
+                <a:solidFill>
+                  <a:srgbClr val="000000"/>
+                </a:solidFill>
+                <a:latin typeface="Calibri" panose="020F0502020204030204" pitchFamily="34" charset="0"/>
+              </a:rPr>
+              <a:t>Activity</a:t>
+            </a:r>
+            <a:r>
+              <a:rPr lang="cs-CZ" sz="1800" b="0" i="0" u="none" strike="noStrike" baseline="0" dirty="0">
+                <a:solidFill>
+                  <a:srgbClr val="000000"/>
+                </a:solidFill>
+                <a:latin typeface="Calibri" panose="020F0502020204030204" pitchFamily="34" charset="0"/>
+              </a:rPr>
+              <a:t>.” </a:t>
+            </a:r>
+            <a:r>
+              <a:rPr lang="cs-CZ" sz="1800" b="0" i="1" u="none" strike="noStrike" baseline="0" dirty="0" err="1">
+                <a:solidFill>
+                  <a:srgbClr val="000000"/>
+                </a:solidFill>
+                <a:latin typeface="Calibri" panose="020F0502020204030204" pitchFamily="34" charset="0"/>
+              </a:rPr>
+              <a:t>Scandinavian</a:t>
+            </a:r>
+            <a:r>
+              <a:rPr lang="cs-CZ" sz="1800" b="0" i="1" u="none" strike="noStrike" baseline="0" dirty="0">
+                <a:solidFill>
+                  <a:srgbClr val="000000"/>
+                </a:solidFill>
+                <a:latin typeface="Calibri" panose="020F0502020204030204" pitchFamily="34" charset="0"/>
+              </a:rPr>
+              <a:t> </a:t>
+            </a:r>
+            <a:r>
+              <a:rPr lang="cs-CZ" sz="1800" b="0" i="1" u="none" strike="noStrike" baseline="0" dirty="0" err="1">
+                <a:solidFill>
+                  <a:srgbClr val="000000"/>
+                </a:solidFill>
+                <a:latin typeface="Calibri" panose="020F0502020204030204" pitchFamily="34" charset="0"/>
+              </a:rPr>
+              <a:t>Journal</a:t>
+            </a:r>
+            <a:r>
+              <a:rPr lang="cs-CZ" sz="1800" b="0" i="1" u="none" strike="noStrike" baseline="0" dirty="0">
+                <a:solidFill>
+                  <a:srgbClr val="000000"/>
+                </a:solidFill>
+                <a:latin typeface="Calibri" panose="020F0502020204030204" pitchFamily="34" charset="0"/>
+              </a:rPr>
+              <a:t> </a:t>
+            </a:r>
+            <a:r>
+              <a:rPr lang="cs-CZ" sz="1800" b="0" i="1" u="none" strike="noStrike" baseline="0" dirty="0" err="1">
+                <a:solidFill>
+                  <a:srgbClr val="000000"/>
+                </a:solidFill>
+                <a:latin typeface="Calibri" panose="020F0502020204030204" pitchFamily="34" charset="0"/>
+              </a:rPr>
+              <a:t>of</a:t>
+            </a:r>
+            <a:r>
+              <a:rPr lang="cs-CZ" sz="1800" b="0" i="1" u="none" strike="noStrike" baseline="0" dirty="0">
+                <a:solidFill>
+                  <a:srgbClr val="000000"/>
+                </a:solidFill>
+                <a:latin typeface="Calibri" panose="020F0502020204030204" pitchFamily="34" charset="0"/>
+              </a:rPr>
+              <a:t> </a:t>
+            </a:r>
+            <a:r>
+              <a:rPr lang="cs-CZ" sz="1800" b="0" i="1" u="none" strike="noStrike" baseline="0" dirty="0" err="1">
+                <a:solidFill>
+                  <a:srgbClr val="000000"/>
+                </a:solidFill>
+                <a:latin typeface="Calibri" panose="020F0502020204030204" pitchFamily="34" charset="0"/>
+              </a:rPr>
+              <a:t>Clinical</a:t>
+            </a:r>
+            <a:r>
+              <a:rPr lang="cs-CZ" sz="1800" b="0" i="1" u="none" strike="noStrike" baseline="0" dirty="0">
+                <a:solidFill>
+                  <a:srgbClr val="000000"/>
+                </a:solidFill>
+                <a:latin typeface="Calibri" panose="020F0502020204030204" pitchFamily="34" charset="0"/>
+              </a:rPr>
+              <a:t> &amp; </a:t>
+            </a:r>
+            <a:r>
+              <a:rPr lang="cs-CZ" sz="1800" b="0" i="1" u="none" strike="noStrike" baseline="0" dirty="0" err="1">
+                <a:solidFill>
+                  <a:srgbClr val="000000"/>
+                </a:solidFill>
+                <a:latin typeface="Calibri" panose="020F0502020204030204" pitchFamily="34" charset="0"/>
+              </a:rPr>
+              <a:t>Laboratory</a:t>
+            </a:r>
+            <a:r>
+              <a:rPr lang="cs-CZ" sz="1800" b="0" i="1" u="none" strike="noStrike" baseline="0" dirty="0">
+                <a:solidFill>
+                  <a:srgbClr val="000000"/>
+                </a:solidFill>
+                <a:latin typeface="Calibri" panose="020F0502020204030204" pitchFamily="34" charset="0"/>
+              </a:rPr>
+              <a:t> </a:t>
+            </a:r>
+            <a:r>
+              <a:rPr lang="cs-CZ" sz="1800" b="0" i="1" u="none" strike="noStrike" baseline="0" dirty="0" err="1">
+                <a:solidFill>
+                  <a:srgbClr val="000000"/>
+                </a:solidFill>
+                <a:latin typeface="Calibri" panose="020F0502020204030204" pitchFamily="34" charset="0"/>
+              </a:rPr>
+              <a:t>Investigation</a:t>
+            </a:r>
+            <a:r>
+              <a:rPr lang="cs-CZ" sz="1800" b="0" i="1" u="none" strike="noStrike" baseline="0" dirty="0">
+                <a:solidFill>
+                  <a:srgbClr val="000000"/>
+                </a:solidFill>
+                <a:latin typeface="Calibri" panose="020F0502020204030204" pitchFamily="34" charset="0"/>
+              </a:rPr>
+              <a:t> </a:t>
+            </a:r>
+            <a:r>
+              <a:rPr lang="cs-CZ" sz="1800" b="0" i="0" u="none" strike="noStrike" baseline="0" dirty="0">
+                <a:solidFill>
+                  <a:srgbClr val="000000"/>
+                </a:solidFill>
+                <a:latin typeface="Calibri" panose="020F0502020204030204" pitchFamily="34" charset="0"/>
+              </a:rPr>
+              <a:t>75 (2): 113–20. https://doi.org/10.3109/00365513.2014.984320. </a:t>
+            </a:r>
+            <a:endParaRPr lang="cs-CZ" dirty="0"/>
+          </a:p>
+        </p:txBody>
+      </p:sp>
+    </p:spTree>
+    <p:extLst>
+      <p:ext uri="{BB962C8B-B14F-4D97-AF65-F5344CB8AC3E}">
+        <p14:creationId xmlns:p14="http://schemas.microsoft.com/office/powerpoint/2010/main" val="1163295889"/>
+      </p:ext>
+    </p:extLst>
+  </p:cSld>
+  <p:clrMapOvr>
+    <a:masterClrMapping/>
+  </p:clrMapOvr>
+</p:sld>
+</file>
+
+<file path=ppt/slides/slide21.xml><?xml version="1.0" encoding="utf-8"?>
+<p:sld xmlns:a="http://schemas.openxmlformats.org/drawingml/2006/main" xmlns:r="http://schemas.openxmlformats.org/officeDocument/2006/relationships" xmlns:p="http://schemas.openxmlformats.org/presentationml/2006/main" show="0">
+  <p:cSld>
+    <p:spTree>
+      <p:nvGrpSpPr>
+        <p:cNvPr id="1" name=""/>
+        <p:cNvGrpSpPr/>
+        <p:nvPr/>
+      </p:nvGrpSpPr>
+      <p:grpSpPr>
+        <a:xfrm>
+          <a:off x="0" y="0"/>
+          <a:ext cx="0" cy="0"/>
+          <a:chOff x="0" y="0"/>
+          <a:chExt cx="0" cy="0"/>
+        </a:xfrm>
+      </p:grpSpPr>
+      <p:sp>
+        <p:nvSpPr>
+          <p:cNvPr id="2" name="Title 1">
+            <a:extLst>
+              <a:ext uri="{FF2B5EF4-FFF2-40B4-BE49-F238E27FC236}">
+                <a16:creationId xmlns:a16="http://schemas.microsoft.com/office/drawing/2014/main" id="{41CB8030-4190-41CE-860F-5752273961ED}"/>
+              </a:ext>
+            </a:extLst>
+          </p:cNvPr>
+          <p:cNvSpPr>
+            <a:spLocks noGrp="1"/>
+          </p:cNvSpPr>
+          <p:nvPr>
+            <p:ph type="title"/>
+          </p:nvPr>
+        </p:nvSpPr>
+        <p:spPr>
+          <a:xfrm>
+            <a:off x="480119" y="57500"/>
+            <a:ext cx="8229600" cy="1143000"/>
+          </a:xfrm>
+        </p:spPr>
+        <p:txBody>
+          <a:bodyPr/>
+          <a:lstStyle/>
+          <a:p>
+            <a:r>
+              <a:rPr lang="en-US" dirty="0"/>
+              <a:t>Hemoglobin Bohr’s effect</a:t>
+            </a:r>
+            <a:endParaRPr lang="cs-CZ" dirty="0"/>
+          </a:p>
+        </p:txBody>
+      </p:sp>
+      <p:pic>
+        <p:nvPicPr>
+          <p:cNvPr id="5" name="Content Placeholder 4">
+            <a:extLst>
+              <a:ext uri="{FF2B5EF4-FFF2-40B4-BE49-F238E27FC236}">
+                <a16:creationId xmlns:a16="http://schemas.microsoft.com/office/drawing/2014/main" id="{1E4304FB-028F-4450-8DBA-36A2794C64D2}"/>
+              </a:ext>
+            </a:extLst>
+          </p:cNvPr>
+          <p:cNvPicPr>
+            <a:picLocks noGrp="1" noChangeAspect="1"/>
+          </p:cNvPicPr>
+          <p:nvPr>
+            <p:ph idx="1"/>
+          </p:nvPr>
+        </p:nvPicPr>
+        <p:blipFill>
+          <a:blip r:embed="rId2">
+            <a:extLst>
+              <a:ext uri="{28A0092B-C50C-407E-A947-70E740481C1C}">
+                <a14:useLocalDpi xmlns:a14="http://schemas.microsoft.com/office/drawing/2010/main" val="0"/>
+              </a:ext>
+            </a:extLst>
+          </a:blip>
+          <a:stretch>
+            <a:fillRect/>
+          </a:stretch>
+        </p:blipFill>
+        <p:spPr>
+          <a:xfrm>
+            <a:off x="914962" y="1166018"/>
+            <a:ext cx="7314076" cy="4525963"/>
+          </a:xfrm>
+        </p:spPr>
+      </p:pic>
+      <p:sp>
+        <p:nvSpPr>
+          <p:cNvPr id="4" name="TextBox 3">
+            <a:extLst>
+              <a:ext uri="{FF2B5EF4-FFF2-40B4-BE49-F238E27FC236}">
+                <a16:creationId xmlns:a16="http://schemas.microsoft.com/office/drawing/2014/main" id="{44649B17-9E43-4C1E-A77E-DDCB784ECD88}"/>
+              </a:ext>
+            </a:extLst>
+          </p:cNvPr>
+          <p:cNvSpPr txBox="1"/>
+          <p:nvPr/>
+        </p:nvSpPr>
+        <p:spPr>
+          <a:xfrm>
+            <a:off x="251520" y="5657671"/>
+            <a:ext cx="8686799" cy="1200329"/>
+          </a:xfrm>
+          <a:prstGeom prst="rect">
+            <a:avLst/>
+          </a:prstGeom>
+          <a:noFill/>
+        </p:spPr>
+        <p:txBody>
+          <a:bodyPr wrap="square" rtlCol="0">
+            <a:spAutoFit/>
+          </a:bodyPr>
+          <a:lstStyle/>
+          <a:p>
+            <a:r>
+              <a:rPr lang="cs-CZ" sz="1800" b="0" i="0" u="none" strike="noStrike" baseline="0" dirty="0">
+                <a:solidFill>
+                  <a:srgbClr val="000000"/>
+                </a:solidFill>
+                <a:latin typeface="Calibri" panose="020F0502020204030204" pitchFamily="34" charset="0"/>
+              </a:rPr>
+              <a:t>Mateják, Marek, Tomáš Kulhánek, and Stanislav Matoušek. 2015. “</a:t>
+            </a:r>
+            <a:r>
+              <a:rPr lang="cs-CZ" sz="1800" b="0" i="0" u="none" strike="noStrike" baseline="0" dirty="0" err="1">
+                <a:solidFill>
+                  <a:srgbClr val="000000"/>
+                </a:solidFill>
+                <a:latin typeface="Calibri" panose="020F0502020204030204" pitchFamily="34" charset="0"/>
+              </a:rPr>
+              <a:t>Adair-Based</a:t>
+            </a:r>
+            <a:r>
+              <a:rPr lang="cs-CZ" sz="1800" b="0" i="0" u="none" strike="noStrike" baseline="0" dirty="0">
+                <a:solidFill>
+                  <a:srgbClr val="000000"/>
+                </a:solidFill>
+                <a:latin typeface="Calibri" panose="020F0502020204030204" pitchFamily="34" charset="0"/>
+              </a:rPr>
+              <a:t> Hemoglobin </a:t>
+            </a:r>
+            <a:r>
+              <a:rPr lang="cs-CZ" sz="1800" b="0" i="0" u="none" strike="noStrike" baseline="0" dirty="0" err="1">
+                <a:solidFill>
+                  <a:srgbClr val="000000"/>
+                </a:solidFill>
+                <a:latin typeface="Calibri" panose="020F0502020204030204" pitchFamily="34" charset="0"/>
+              </a:rPr>
+              <a:t>Equilibrium</a:t>
+            </a:r>
+            <a:r>
+              <a:rPr lang="cs-CZ" sz="1800" b="0" i="0" u="none" strike="noStrike" baseline="0" dirty="0">
+                <a:solidFill>
+                  <a:srgbClr val="000000"/>
+                </a:solidFill>
+                <a:latin typeface="Calibri" panose="020F0502020204030204" pitchFamily="34" charset="0"/>
+              </a:rPr>
+              <a:t> </a:t>
+            </a:r>
+            <a:r>
+              <a:rPr lang="cs-CZ" sz="1800" b="0" i="0" u="none" strike="noStrike" baseline="0" dirty="0" err="1">
+                <a:solidFill>
+                  <a:srgbClr val="000000"/>
+                </a:solidFill>
+                <a:latin typeface="Calibri" panose="020F0502020204030204" pitchFamily="34" charset="0"/>
+              </a:rPr>
+              <a:t>with</a:t>
+            </a:r>
+            <a:r>
+              <a:rPr lang="cs-CZ" sz="1800" b="0" i="0" u="none" strike="noStrike" baseline="0" dirty="0">
+                <a:solidFill>
+                  <a:srgbClr val="000000"/>
+                </a:solidFill>
+                <a:latin typeface="Calibri" panose="020F0502020204030204" pitchFamily="34" charset="0"/>
+              </a:rPr>
+              <a:t> Oxygen, </a:t>
+            </a:r>
+            <a:r>
+              <a:rPr lang="cs-CZ" sz="1800" b="0" i="0" u="none" strike="noStrike" baseline="0" dirty="0" err="1">
+                <a:solidFill>
+                  <a:srgbClr val="000000"/>
+                </a:solidFill>
+                <a:latin typeface="Calibri" panose="020F0502020204030204" pitchFamily="34" charset="0"/>
+              </a:rPr>
+              <a:t>Carbon</a:t>
+            </a:r>
+            <a:r>
+              <a:rPr lang="cs-CZ" sz="1800" b="0" i="0" u="none" strike="noStrike" baseline="0" dirty="0">
+                <a:solidFill>
+                  <a:srgbClr val="000000"/>
+                </a:solidFill>
+                <a:latin typeface="Calibri" panose="020F0502020204030204" pitchFamily="34" charset="0"/>
+              </a:rPr>
+              <a:t> Dioxide and Hydrogen Ion </a:t>
+            </a:r>
+            <a:r>
+              <a:rPr lang="cs-CZ" sz="1800" b="0" i="0" u="none" strike="noStrike" baseline="0" dirty="0" err="1">
+                <a:solidFill>
+                  <a:srgbClr val="000000"/>
+                </a:solidFill>
+                <a:latin typeface="Calibri" panose="020F0502020204030204" pitchFamily="34" charset="0"/>
+              </a:rPr>
+              <a:t>Activity</a:t>
+            </a:r>
+            <a:r>
+              <a:rPr lang="cs-CZ" sz="1800" b="0" i="0" u="none" strike="noStrike" baseline="0" dirty="0">
+                <a:solidFill>
+                  <a:srgbClr val="000000"/>
+                </a:solidFill>
+                <a:latin typeface="Calibri" panose="020F0502020204030204" pitchFamily="34" charset="0"/>
+              </a:rPr>
+              <a:t>.” </a:t>
+            </a:r>
+            <a:r>
+              <a:rPr lang="cs-CZ" sz="1800" b="0" i="1" u="none" strike="noStrike" baseline="0" dirty="0" err="1">
+                <a:solidFill>
+                  <a:srgbClr val="000000"/>
+                </a:solidFill>
+                <a:latin typeface="Calibri" panose="020F0502020204030204" pitchFamily="34" charset="0"/>
+              </a:rPr>
+              <a:t>Scandinavian</a:t>
+            </a:r>
+            <a:r>
+              <a:rPr lang="cs-CZ" sz="1800" b="0" i="1" u="none" strike="noStrike" baseline="0" dirty="0">
+                <a:solidFill>
+                  <a:srgbClr val="000000"/>
+                </a:solidFill>
+                <a:latin typeface="Calibri" panose="020F0502020204030204" pitchFamily="34" charset="0"/>
+              </a:rPr>
+              <a:t> </a:t>
+            </a:r>
+            <a:r>
+              <a:rPr lang="cs-CZ" sz="1800" b="0" i="1" u="none" strike="noStrike" baseline="0" dirty="0" err="1">
+                <a:solidFill>
+                  <a:srgbClr val="000000"/>
+                </a:solidFill>
+                <a:latin typeface="Calibri" panose="020F0502020204030204" pitchFamily="34" charset="0"/>
+              </a:rPr>
+              <a:t>Journal</a:t>
+            </a:r>
+            <a:r>
+              <a:rPr lang="cs-CZ" sz="1800" b="0" i="1" u="none" strike="noStrike" baseline="0" dirty="0">
+                <a:solidFill>
+                  <a:srgbClr val="000000"/>
+                </a:solidFill>
+                <a:latin typeface="Calibri" panose="020F0502020204030204" pitchFamily="34" charset="0"/>
+              </a:rPr>
+              <a:t> </a:t>
+            </a:r>
+            <a:r>
+              <a:rPr lang="cs-CZ" sz="1800" b="0" i="1" u="none" strike="noStrike" baseline="0" dirty="0" err="1">
+                <a:solidFill>
+                  <a:srgbClr val="000000"/>
+                </a:solidFill>
+                <a:latin typeface="Calibri" panose="020F0502020204030204" pitchFamily="34" charset="0"/>
+              </a:rPr>
+              <a:t>of</a:t>
+            </a:r>
+            <a:r>
+              <a:rPr lang="cs-CZ" sz="1800" b="0" i="1" u="none" strike="noStrike" baseline="0" dirty="0">
+                <a:solidFill>
+                  <a:srgbClr val="000000"/>
+                </a:solidFill>
+                <a:latin typeface="Calibri" panose="020F0502020204030204" pitchFamily="34" charset="0"/>
+              </a:rPr>
+              <a:t> </a:t>
+            </a:r>
+            <a:r>
+              <a:rPr lang="cs-CZ" sz="1800" b="0" i="1" u="none" strike="noStrike" baseline="0" dirty="0" err="1">
+                <a:solidFill>
+                  <a:srgbClr val="000000"/>
+                </a:solidFill>
+                <a:latin typeface="Calibri" panose="020F0502020204030204" pitchFamily="34" charset="0"/>
+              </a:rPr>
+              <a:t>Clinical</a:t>
+            </a:r>
+            <a:r>
+              <a:rPr lang="cs-CZ" sz="1800" b="0" i="1" u="none" strike="noStrike" baseline="0" dirty="0">
+                <a:solidFill>
+                  <a:srgbClr val="000000"/>
+                </a:solidFill>
+                <a:latin typeface="Calibri" panose="020F0502020204030204" pitchFamily="34" charset="0"/>
+              </a:rPr>
+              <a:t> &amp; </a:t>
+            </a:r>
+            <a:r>
+              <a:rPr lang="cs-CZ" sz="1800" b="0" i="1" u="none" strike="noStrike" baseline="0" dirty="0" err="1">
+                <a:solidFill>
+                  <a:srgbClr val="000000"/>
+                </a:solidFill>
+                <a:latin typeface="Calibri" panose="020F0502020204030204" pitchFamily="34" charset="0"/>
+              </a:rPr>
+              <a:t>Laboratory</a:t>
+            </a:r>
+            <a:r>
+              <a:rPr lang="cs-CZ" sz="1800" b="0" i="1" u="none" strike="noStrike" baseline="0" dirty="0">
+                <a:solidFill>
+                  <a:srgbClr val="000000"/>
+                </a:solidFill>
+                <a:latin typeface="Calibri" panose="020F0502020204030204" pitchFamily="34" charset="0"/>
+              </a:rPr>
+              <a:t> </a:t>
+            </a:r>
+            <a:r>
+              <a:rPr lang="cs-CZ" sz="1800" b="0" i="1" u="none" strike="noStrike" baseline="0" dirty="0" err="1">
+                <a:solidFill>
+                  <a:srgbClr val="000000"/>
+                </a:solidFill>
+                <a:latin typeface="Calibri" panose="020F0502020204030204" pitchFamily="34" charset="0"/>
+              </a:rPr>
+              <a:t>Investigation</a:t>
+            </a:r>
+            <a:r>
+              <a:rPr lang="cs-CZ" sz="1800" b="0" i="1" u="none" strike="noStrike" baseline="0" dirty="0">
+                <a:solidFill>
+                  <a:srgbClr val="000000"/>
+                </a:solidFill>
+                <a:latin typeface="Calibri" panose="020F0502020204030204" pitchFamily="34" charset="0"/>
+              </a:rPr>
+              <a:t> </a:t>
+            </a:r>
+            <a:r>
+              <a:rPr lang="cs-CZ" sz="1800" b="0" i="0" u="none" strike="noStrike" baseline="0" dirty="0">
+                <a:solidFill>
+                  <a:srgbClr val="000000"/>
+                </a:solidFill>
+                <a:latin typeface="Calibri" panose="020F0502020204030204" pitchFamily="34" charset="0"/>
+              </a:rPr>
+              <a:t>75 (2): 113–20. https://doi.org/10.3109/00365513.2014.984320. </a:t>
+            </a:r>
+            <a:endParaRPr lang="cs-CZ" dirty="0"/>
+          </a:p>
+        </p:txBody>
+      </p:sp>
+    </p:spTree>
+    <p:extLst>
+      <p:ext uri="{BB962C8B-B14F-4D97-AF65-F5344CB8AC3E}">
+        <p14:creationId xmlns:p14="http://schemas.microsoft.com/office/powerpoint/2010/main" val="528523672"/>
+      </p:ext>
+    </p:extLst>
+  </p:cSld>
+  <p:clrMapOvr>
+    <a:masterClrMapping/>
+  </p:clrMapOvr>
+</p:sld>
+</file>
+
+<file path=ppt/slides/slide22.xml><?xml version="1.0" encoding="utf-8"?>
+<p:sld xmlns:a="http://schemas.openxmlformats.org/drawingml/2006/main" xmlns:r="http://schemas.openxmlformats.org/officeDocument/2006/relationships" xmlns:p="http://schemas.openxmlformats.org/presentationml/2006/main" show="0">
+  <p:cSld>
+    <p:spTree>
+      <p:nvGrpSpPr>
+        <p:cNvPr id="1" name=""/>
+        <p:cNvGrpSpPr/>
+        <p:nvPr/>
+      </p:nvGrpSpPr>
+      <p:grpSpPr>
+        <a:xfrm>
+          <a:off x="0" y="0"/>
+          <a:ext cx="0" cy="0"/>
+          <a:chOff x="0" y="0"/>
+          <a:chExt cx="0" cy="0"/>
+        </a:xfrm>
+      </p:grpSpPr>
+      <p:sp>
+        <p:nvSpPr>
+          <p:cNvPr id="2" name="Title 1">
+            <a:extLst>
+              <a:ext uri="{FF2B5EF4-FFF2-40B4-BE49-F238E27FC236}">
+                <a16:creationId xmlns:a16="http://schemas.microsoft.com/office/drawing/2014/main" id="{5CD465E0-42FF-454E-BC9E-96B8393C3090}"/>
+              </a:ext>
+            </a:extLst>
+          </p:cNvPr>
+          <p:cNvSpPr>
+            <a:spLocks noGrp="1"/>
+          </p:cNvSpPr>
+          <p:nvPr>
+            <p:ph type="title"/>
+          </p:nvPr>
+        </p:nvSpPr>
+        <p:spPr/>
+        <p:txBody>
+          <a:bodyPr/>
+          <a:lstStyle/>
+          <a:p>
+            <a:r>
+              <a:rPr lang="en-US" dirty="0"/>
+              <a:t>Acid-base</a:t>
+            </a:r>
+            <a:endParaRPr lang="cs-CZ" dirty="0"/>
+          </a:p>
+        </p:txBody>
+      </p:sp>
+      <mc:AlternateContent xmlns:mc="http://schemas.openxmlformats.org/markup-compatibility/2006" xmlns:a14="http://schemas.microsoft.com/office/drawing/2010/main">
+        <mc:Choice Requires="a14">
+          <p:sp>
+            <p:nvSpPr>
+              <p:cNvPr id="3" name="Content Placeholder 2">
+                <a:extLst>
+                  <a:ext uri="{FF2B5EF4-FFF2-40B4-BE49-F238E27FC236}">
+                    <a16:creationId xmlns:a16="http://schemas.microsoft.com/office/drawing/2014/main" id="{C172E84B-F30E-42F1-ADE5-3B37A97F5FF0}"/>
+                  </a:ext>
+                </a:extLst>
+              </p:cNvPr>
+              <p:cNvSpPr>
+                <a:spLocks noGrp="1"/>
+              </p:cNvSpPr>
+              <p:nvPr>
+                <p:ph idx="1"/>
+              </p:nvPr>
+            </p:nvSpPr>
+            <p:spPr/>
+            <p:txBody>
+              <a:bodyPr>
+                <a:normAutofit/>
+              </a:bodyPr>
+              <a:lstStyle/>
+              <a:p>
+                <a:r>
+                  <a:rPr lang="cs-CZ" sz="1800" b="0" i="0" dirty="0">
+                    <a:effectLst/>
+                    <a:latin typeface="Courier New" panose="02070309020205020404" pitchFamily="49" charset="0"/>
+                  </a:rPr>
+                  <a:t>NSIDP</a:t>
+                </a:r>
+                <a:r>
+                  <a:rPr lang="en-US" sz="1800" b="0" i="0" dirty="0">
+                    <a:effectLst/>
+                    <a:latin typeface="Courier New" panose="02070309020205020404" pitchFamily="49" charset="0"/>
+                  </a:rPr>
+                  <a:t>(Alb,Glb,PO4)</a:t>
+                </a:r>
+              </a:p>
+              <a:p>
+                <a:pPr lvl="1"/>
+                <a:r>
+                  <a:rPr lang="en-US" sz="1400" b="0" i="0" dirty="0">
+                    <a:solidFill>
+                      <a:srgbClr val="006400"/>
+                    </a:solidFill>
+                    <a:effectLst/>
+                    <a:latin typeface="Courier New" panose="02070309020205020404" pitchFamily="49" charset="0"/>
+                  </a:rPr>
+                  <a:t>charge on blood plasma acid-base buffers</a:t>
+                </a:r>
+                <a:r>
+                  <a:rPr lang="cs-CZ" sz="1400" b="0" i="0" dirty="0">
+                    <a:solidFill>
+                      <a:srgbClr val="006400"/>
+                    </a:solidFill>
+                    <a:effectLst/>
+                    <a:latin typeface="Courier New" panose="02070309020205020404" pitchFamily="49" charset="0"/>
+                  </a:rPr>
+                  <a:t> </a:t>
+                </a:r>
+                <a:br>
+                  <a:rPr lang="en-US" sz="1400" b="0" i="0" dirty="0">
+                    <a:solidFill>
+                      <a:srgbClr val="006400"/>
+                    </a:solidFill>
+                    <a:effectLst/>
+                    <a:latin typeface="Courier New" panose="02070309020205020404" pitchFamily="49" charset="0"/>
+                  </a:rPr>
+                </a:br>
+                <a:r>
+                  <a:rPr lang="cs-CZ" sz="1400" b="0" i="0" dirty="0" err="1">
+                    <a:solidFill>
+                      <a:srgbClr val="006400"/>
+                    </a:solidFill>
+                    <a:effectLst/>
+                    <a:latin typeface="Courier New" panose="02070309020205020404" pitchFamily="49" charset="0"/>
+                  </a:rPr>
+                  <a:t>at</a:t>
+                </a:r>
+                <a:r>
+                  <a:rPr lang="cs-CZ" sz="1400" b="0" i="0" dirty="0">
+                    <a:solidFill>
+                      <a:srgbClr val="006400"/>
+                    </a:solidFill>
+                    <a:effectLst/>
+                    <a:latin typeface="Courier New" panose="02070309020205020404" pitchFamily="49" charset="0"/>
+                  </a:rPr>
+                  <a:t> pH=7.4, pCO2=40mmHg, T=37degC and sO2=1</a:t>
+                </a:r>
+                <a:endParaRPr lang="cs-CZ" sz="1400" b="0" i="0" dirty="0">
+                  <a:effectLst/>
+                  <a:latin typeface="Segoe UI" panose="020B0502040204020203" pitchFamily="34" charset="0"/>
+                </a:endParaRPr>
+              </a:p>
+              <a:p>
+                <a:r>
+                  <a:rPr lang="cs-CZ" sz="1800" b="0" i="0" dirty="0">
+                    <a:effectLst/>
+                    <a:latin typeface="Courier New" panose="02070309020205020404" pitchFamily="49" charset="0"/>
+                  </a:rPr>
+                  <a:t>NSIDE</a:t>
+                </a:r>
+                <a:r>
+                  <a:rPr lang="en-US" sz="1800" dirty="0">
+                    <a:latin typeface="Courier New" panose="02070309020205020404" pitchFamily="49" charset="0"/>
+                  </a:rPr>
+                  <a:t>(</a:t>
+                </a:r>
+                <a:r>
+                  <a:rPr lang="en-US" sz="1800" dirty="0" err="1">
+                    <a:latin typeface="Courier New" panose="02070309020205020404" pitchFamily="49" charset="0"/>
+                  </a:rPr>
+                  <a:t>Hb,DPG</a:t>
+                </a:r>
+                <a:r>
+                  <a:rPr lang="en-US" sz="1800" dirty="0">
+                    <a:latin typeface="Courier New" panose="02070309020205020404" pitchFamily="49" charset="0"/>
+                  </a:rPr>
+                  <a:t>)</a:t>
+                </a:r>
+                <a:r>
+                  <a:rPr lang="en-US" sz="1800" b="0" i="0" dirty="0">
+                    <a:effectLst/>
+                    <a:latin typeface="Courier New" panose="02070309020205020404" pitchFamily="49" charset="0"/>
+                  </a:rPr>
+                  <a:t> </a:t>
+                </a:r>
+              </a:p>
+              <a:p>
+                <a:pPr lvl="1"/>
+                <a:r>
+                  <a:rPr lang="en-US" sz="1400" b="0" i="0" dirty="0">
+                    <a:solidFill>
+                      <a:srgbClr val="006400"/>
+                    </a:solidFill>
+                    <a:effectLst/>
+                    <a:latin typeface="Courier New" panose="02070309020205020404" pitchFamily="49" charset="0"/>
+                  </a:rPr>
+                  <a:t>charge on</a:t>
+                </a:r>
+                <a:r>
+                  <a:rPr lang="cs-CZ" sz="1400" b="0" i="0" dirty="0">
+                    <a:solidFill>
+                      <a:srgbClr val="006400"/>
+                    </a:solidFill>
+                    <a:effectLst/>
+                    <a:latin typeface="Courier New" panose="02070309020205020404" pitchFamily="49" charset="0"/>
+                  </a:rPr>
+                  <a:t> </a:t>
+                </a:r>
+                <a:r>
+                  <a:rPr lang="cs-CZ" sz="1400" b="0" i="0" dirty="0" err="1">
+                    <a:solidFill>
+                      <a:srgbClr val="006400"/>
+                    </a:solidFill>
+                    <a:effectLst/>
+                    <a:latin typeface="Courier New" panose="02070309020205020404" pitchFamily="49" charset="0"/>
+                  </a:rPr>
+                  <a:t>red</a:t>
+                </a:r>
+                <a:r>
+                  <a:rPr lang="cs-CZ" sz="1400" b="0" i="0" dirty="0">
+                    <a:solidFill>
+                      <a:srgbClr val="006400"/>
+                    </a:solidFill>
+                    <a:effectLst/>
+                    <a:latin typeface="Courier New" panose="02070309020205020404" pitchFamily="49" charset="0"/>
+                  </a:rPr>
+                  <a:t> </a:t>
+                </a:r>
+                <a:r>
+                  <a:rPr lang="cs-CZ" sz="1400" b="0" i="0" dirty="0" err="1">
+                    <a:solidFill>
+                      <a:srgbClr val="006400"/>
+                    </a:solidFill>
+                    <a:effectLst/>
+                    <a:latin typeface="Courier New" panose="02070309020205020404" pitchFamily="49" charset="0"/>
+                  </a:rPr>
+                  <a:t>cells</a:t>
+                </a:r>
+                <a:r>
+                  <a:rPr lang="en-US" sz="1400" b="0" i="0" dirty="0">
+                    <a:solidFill>
+                      <a:srgbClr val="006400"/>
+                    </a:solidFill>
+                    <a:effectLst/>
+                    <a:latin typeface="Courier New" panose="02070309020205020404" pitchFamily="49" charset="0"/>
+                  </a:rPr>
+                  <a:t> acid-base buffers</a:t>
+                </a:r>
+                <a:r>
+                  <a:rPr lang="cs-CZ" sz="1400" b="0" i="0" dirty="0">
+                    <a:solidFill>
+                      <a:srgbClr val="006400"/>
+                    </a:solidFill>
+                    <a:effectLst/>
+                    <a:latin typeface="Courier New" panose="02070309020205020404" pitchFamily="49" charset="0"/>
+                  </a:rPr>
+                  <a:t> </a:t>
+                </a:r>
+                <a:br>
+                  <a:rPr lang="en-US" sz="1400" b="0" i="0" dirty="0">
+                    <a:solidFill>
+                      <a:srgbClr val="006400"/>
+                    </a:solidFill>
+                    <a:effectLst/>
+                    <a:latin typeface="Courier New" panose="02070309020205020404" pitchFamily="49" charset="0"/>
+                  </a:rPr>
+                </a:br>
+                <a:r>
+                  <a:rPr lang="cs-CZ" sz="1400" b="0" i="0" dirty="0" err="1">
+                    <a:solidFill>
+                      <a:srgbClr val="006400"/>
+                    </a:solidFill>
+                    <a:effectLst/>
+                    <a:latin typeface="Courier New" panose="02070309020205020404" pitchFamily="49" charset="0"/>
+                  </a:rPr>
+                  <a:t>at</a:t>
+                </a:r>
+                <a:r>
+                  <a:rPr lang="cs-CZ" sz="1400" b="0" i="0" dirty="0">
+                    <a:solidFill>
+                      <a:srgbClr val="006400"/>
+                    </a:solidFill>
+                    <a:effectLst/>
+                    <a:latin typeface="Courier New" panose="02070309020205020404" pitchFamily="49" charset="0"/>
+                  </a:rPr>
+                  <a:t> </a:t>
+                </a:r>
+                <a:r>
+                  <a:rPr lang="cs-CZ" sz="1400" b="0" i="0" dirty="0" err="1">
+                    <a:solidFill>
+                      <a:srgbClr val="006400"/>
+                    </a:solidFill>
+                    <a:effectLst/>
+                    <a:latin typeface="Courier New" panose="02070309020205020404" pitchFamily="49" charset="0"/>
+                  </a:rPr>
+                  <a:t>pH_ery</a:t>
+                </a:r>
+                <a:r>
+                  <a:rPr lang="cs-CZ" sz="1400" b="0" i="0" dirty="0">
+                    <a:solidFill>
+                      <a:srgbClr val="006400"/>
+                    </a:solidFill>
+                    <a:effectLst/>
+                    <a:latin typeface="Courier New" panose="02070309020205020404" pitchFamily="49" charset="0"/>
+                  </a:rPr>
+                  <a:t>=7.19, pCO2=40mmHg, T=37degC and sO2=1</a:t>
+                </a:r>
+                <a:endParaRPr lang="cs-CZ" sz="1400" b="0" i="0" dirty="0">
+                  <a:effectLst/>
+                  <a:latin typeface="Segoe UI" panose="020B0502040204020203" pitchFamily="34" charset="0"/>
+                </a:endParaRPr>
+              </a:p>
+              <a:p>
+                <a:r>
+                  <a:rPr lang="en-US" sz="1800" b="0" i="0" dirty="0">
+                    <a:effectLst/>
+                    <a:latin typeface="Courier New" panose="02070309020205020404" pitchFamily="49" charset="0"/>
+                  </a:rPr>
+                  <a:t>NSID = </a:t>
+                </a:r>
+                <a:r>
+                  <a:rPr lang="en-US" sz="1800" b="0" i="0" dirty="0" err="1">
+                    <a:effectLst/>
+                    <a:latin typeface="Courier New" panose="02070309020205020404" pitchFamily="49" charset="0"/>
+                  </a:rPr>
+                  <a:t>Hct</a:t>
+                </a:r>
+                <a:r>
+                  <a:rPr lang="en-US" sz="1800" b="0" i="0" dirty="0">
+                    <a:effectLst/>
+                    <a:latin typeface="Courier New" panose="02070309020205020404" pitchFamily="49" charset="0"/>
+                  </a:rPr>
+                  <a:t>*NSIDE + (1 - </a:t>
+                </a:r>
+                <a:r>
+                  <a:rPr lang="en-US" sz="1800" b="0" i="0" dirty="0" err="1">
+                    <a:effectLst/>
+                    <a:latin typeface="Courier New" panose="02070309020205020404" pitchFamily="49" charset="0"/>
+                  </a:rPr>
+                  <a:t>Hct</a:t>
+                </a:r>
+                <a:r>
+                  <a:rPr lang="en-US" sz="1800" b="0" i="0" dirty="0">
+                    <a:effectLst/>
+                    <a:latin typeface="Courier New" panose="02070309020205020404" pitchFamily="49" charset="0"/>
+                  </a:rPr>
+                  <a:t>)*NSIDP</a:t>
+                </a:r>
+                <a:endParaRPr lang="en-US" sz="1800" dirty="0">
+                  <a:latin typeface="Segoe UI" panose="020B0502040204020203" pitchFamily="34" charset="0"/>
+                </a:endParaRPr>
+              </a:p>
+              <a:p>
+                <a:pPr lvl="1"/>
+                <a:r>
+                  <a:rPr lang="en-US" sz="1400" dirty="0">
+                    <a:solidFill>
+                      <a:srgbClr val="006400"/>
+                    </a:solidFill>
+                    <a:latin typeface="Courier New" panose="02070309020205020404" pitchFamily="49" charset="0"/>
+                  </a:rPr>
+                  <a:t>charge on acid-base buffers</a:t>
+                </a:r>
+                <a:r>
+                  <a:rPr lang="en-US" sz="1400" b="0" i="0" dirty="0">
+                    <a:solidFill>
+                      <a:srgbClr val="006400"/>
+                    </a:solidFill>
+                    <a:effectLst/>
+                    <a:latin typeface="Courier New" panose="02070309020205020404" pitchFamily="49" charset="0"/>
+                  </a:rPr>
+                  <a:t> of blood </a:t>
+                </a:r>
+                <a:br>
+                  <a:rPr lang="en-US" sz="1400" b="0" i="0" dirty="0">
+                    <a:solidFill>
+                      <a:srgbClr val="006400"/>
+                    </a:solidFill>
+                    <a:effectLst/>
+                    <a:latin typeface="Courier New" panose="02070309020205020404" pitchFamily="49" charset="0"/>
+                  </a:rPr>
+                </a:br>
+                <a:r>
+                  <a:rPr lang="en-US" sz="1400" b="0" i="0" dirty="0">
+                    <a:solidFill>
+                      <a:srgbClr val="006400"/>
+                    </a:solidFill>
+                    <a:effectLst/>
+                    <a:latin typeface="Courier New" panose="02070309020205020404" pitchFamily="49" charset="0"/>
+                  </a:rPr>
+                  <a:t>at pH=7.4 (</a:t>
+                </a:r>
+                <a:r>
+                  <a:rPr lang="en-US" sz="1400" b="0" i="0" dirty="0" err="1">
+                    <a:solidFill>
+                      <a:srgbClr val="006400"/>
+                    </a:solidFill>
+                    <a:effectLst/>
+                    <a:latin typeface="Courier New" panose="02070309020205020404" pitchFamily="49" charset="0"/>
+                  </a:rPr>
+                  <a:t>pH_ery</a:t>
+                </a:r>
+                <a:r>
+                  <a:rPr lang="en-US" sz="1400" b="0" i="0" dirty="0">
+                    <a:solidFill>
+                      <a:srgbClr val="006400"/>
+                    </a:solidFill>
+                    <a:effectLst/>
+                    <a:latin typeface="Courier New" panose="02070309020205020404" pitchFamily="49" charset="0"/>
+                  </a:rPr>
+                  <a:t>=7.19), pCO2=40mmHg, T=37degC and sO2=1</a:t>
+                </a:r>
+                <a:endParaRPr lang="en-US" sz="1400" b="0" i="0" dirty="0">
+                  <a:effectLst/>
+                  <a:latin typeface="Segoe UI" panose="020B0502040204020203" pitchFamily="34" charset="0"/>
+                </a:endParaRPr>
+              </a:p>
+              <a:p>
+                <a:r>
+                  <a:rPr lang="en-US" sz="1800" b="0" i="0" dirty="0" err="1">
+                    <a:effectLst/>
+                    <a:latin typeface="Courier New" panose="02070309020205020404" pitchFamily="49" charset="0"/>
+                  </a:rPr>
+                  <a:t>BEox</a:t>
+                </a:r>
+                <a:r>
+                  <a:rPr lang="en-US" sz="1800" b="0" i="0" dirty="0">
+                    <a:effectLst/>
+                    <a:latin typeface="Courier New" panose="02070309020205020404" pitchFamily="49" charset="0"/>
+                  </a:rPr>
+                  <a:t> = NSID - SID(</a:t>
+                </a:r>
+                <a:r>
+                  <a:rPr lang="en-US" sz="1800" b="0" i="0" dirty="0" err="1">
+                    <a:effectLst/>
+                    <a:latin typeface="Courier New" panose="02070309020205020404" pitchFamily="49" charset="0"/>
+                  </a:rPr>
+                  <a:t>Na,K,Cl,Lac</a:t>
+                </a:r>
+                <a:r>
+                  <a:rPr lang="en-US" sz="1800" b="0" i="0" dirty="0">
+                    <a:effectLst/>
+                    <a:latin typeface="Courier New" panose="02070309020205020404" pitchFamily="49" charset="0"/>
+                  </a:rPr>
+                  <a:t>)</a:t>
+                </a:r>
+              </a:p>
+              <a:p>
+                <a:pPr lvl="1"/>
+                <a:r>
+                  <a:rPr lang="en-US" sz="1400" b="0" i="0" dirty="0">
+                    <a:solidFill>
+                      <a:srgbClr val="006400"/>
+                    </a:solidFill>
+                    <a:effectLst/>
+                    <a:latin typeface="Courier New" panose="02070309020205020404" pitchFamily="49" charset="0"/>
+                  </a:rPr>
+                  <a:t>base excess of oxygenated blood</a:t>
+                </a:r>
+                <a:endParaRPr lang="en-US" sz="1400" b="0" i="0" dirty="0">
+                  <a:effectLst/>
+                  <a:latin typeface="Segoe UI" panose="020B0502040204020203" pitchFamily="34" charset="0"/>
+                </a:endParaRPr>
+              </a:p>
+              <a:p>
+                <a:r>
+                  <a:rPr lang="en-US" sz="1800" dirty="0">
+                    <a:latin typeface="Courier New" panose="02070309020205020404" pitchFamily="49" charset="0"/>
+                  </a:rPr>
+                  <a:t>b</a:t>
+                </a:r>
+                <a:r>
+                  <a:rPr lang="cs-CZ" sz="1800" b="0" i="0" dirty="0" err="1">
+                    <a:effectLst/>
+                    <a:latin typeface="Courier New" panose="02070309020205020404" pitchFamily="49" charset="0"/>
+                  </a:rPr>
+                  <a:t>eta</a:t>
+                </a:r>
+                <a:r>
+                  <a:rPr lang="en-US" sz="1800" b="0" i="0" dirty="0">
+                    <a:effectLst/>
+                    <a:latin typeface="Courier New" panose="02070309020205020404" pitchFamily="49" charset="0"/>
+                  </a:rPr>
+                  <a:t>(</a:t>
+                </a:r>
+                <a:r>
+                  <a:rPr lang="cs-CZ" sz="1800" b="0" i="0" dirty="0" err="1">
+                    <a:effectLst/>
+                    <a:latin typeface="Courier New" panose="02070309020205020404" pitchFamily="49" charset="0"/>
+                  </a:rPr>
+                  <a:t>Hb</a:t>
+                </a:r>
+                <a:r>
+                  <a:rPr lang="en-US" sz="1800" b="0" i="0" dirty="0">
+                    <a:effectLst/>
+                    <a:latin typeface="Courier New" panose="02070309020205020404" pitchFamily="49" charset="0"/>
+                  </a:rPr>
+                  <a:t>,</a:t>
+                </a:r>
+                <a:r>
+                  <a:rPr lang="cs-CZ" sz="1800" b="0" i="0" dirty="0">
+                    <a:effectLst/>
+                    <a:latin typeface="Courier New" panose="02070309020205020404" pitchFamily="49" charset="0"/>
+                  </a:rPr>
+                  <a:t>Alb</a:t>
+                </a:r>
+                <a:r>
+                  <a:rPr lang="en-US" sz="1800" b="0" i="0" dirty="0">
+                    <a:effectLst/>
+                    <a:latin typeface="Courier New" panose="02070309020205020404" pitchFamily="49" charset="0"/>
+                  </a:rPr>
+                  <a:t>,</a:t>
+                </a:r>
+                <a:r>
+                  <a:rPr lang="cs-CZ" sz="1800" b="0" i="0" dirty="0" err="1">
+                    <a:effectLst/>
+                    <a:latin typeface="Courier New" panose="02070309020205020404" pitchFamily="49" charset="0"/>
+                  </a:rPr>
+                  <a:t>Glb</a:t>
+                </a:r>
+                <a:r>
+                  <a:rPr lang="en-US" sz="1800" b="0" i="0" dirty="0">
+                    <a:effectLst/>
+                    <a:latin typeface="Courier New" panose="02070309020205020404" pitchFamily="49" charset="0"/>
+                  </a:rPr>
+                  <a:t>,</a:t>
+                </a:r>
+                <a:r>
+                  <a:rPr lang="cs-CZ" sz="1800" b="0" i="0" dirty="0">
+                    <a:effectLst/>
+                    <a:latin typeface="Courier New" panose="02070309020205020404" pitchFamily="49" charset="0"/>
+                  </a:rPr>
+                  <a:t>PO4</a:t>
+                </a:r>
+                <a:r>
+                  <a:rPr lang="en-US" sz="1800" b="0" i="0" dirty="0">
+                    <a:effectLst/>
+                    <a:latin typeface="Courier New" panose="02070309020205020404" pitchFamily="49" charset="0"/>
+                  </a:rPr>
+                  <a:t>)</a:t>
+                </a:r>
+                <a:endParaRPr lang="en-US" sz="1800" dirty="0">
+                  <a:latin typeface="Courier New" panose="02070309020205020404" pitchFamily="49" charset="0"/>
+                </a:endParaRPr>
+              </a:p>
+              <a:p>
+                <a:pPr lvl="1"/>
+                <a:r>
+                  <a:rPr lang="cs-CZ" sz="1400" b="0" i="0" dirty="0">
+                    <a:solidFill>
+                      <a:srgbClr val="006400"/>
+                    </a:solidFill>
+                    <a:effectLst/>
+                    <a:latin typeface="Courier New" panose="02070309020205020404" pitchFamily="49" charset="0"/>
+                  </a:rPr>
+                  <a:t>buffer </a:t>
+                </a:r>
+                <a:r>
+                  <a:rPr lang="cs-CZ" sz="1400" b="0" i="0" dirty="0" err="1">
+                    <a:solidFill>
+                      <a:srgbClr val="006400"/>
+                    </a:solidFill>
+                    <a:effectLst/>
+                    <a:latin typeface="Courier New" panose="02070309020205020404" pitchFamily="49" charset="0"/>
+                  </a:rPr>
+                  <a:t>value</a:t>
+                </a:r>
+                <a:r>
+                  <a:rPr lang="cs-CZ" sz="1400" b="0" i="0" dirty="0">
+                    <a:solidFill>
+                      <a:srgbClr val="006400"/>
+                    </a:solidFill>
+                    <a:effectLst/>
+                    <a:latin typeface="Courier New" panose="02070309020205020404" pitchFamily="49" charset="0"/>
+                  </a:rPr>
+                  <a:t> </a:t>
+                </a:r>
+                <a:r>
+                  <a:rPr lang="cs-CZ" sz="1400" b="0" i="0" dirty="0" err="1">
+                    <a:solidFill>
+                      <a:srgbClr val="006400"/>
+                    </a:solidFill>
+                    <a:effectLst/>
+                    <a:latin typeface="Courier New" panose="02070309020205020404" pitchFamily="49" charset="0"/>
+                  </a:rPr>
+                  <a:t>of</a:t>
+                </a:r>
+                <a:r>
+                  <a:rPr lang="cs-CZ" sz="1400" b="0" i="0" dirty="0">
+                    <a:solidFill>
+                      <a:srgbClr val="006400"/>
+                    </a:solidFill>
+                    <a:effectLst/>
+                    <a:latin typeface="Courier New" panose="02070309020205020404" pitchFamily="49" charset="0"/>
+                  </a:rPr>
+                  <a:t> </a:t>
+                </a:r>
+                <a:r>
+                  <a:rPr lang="cs-CZ" sz="1400" b="0" i="0" dirty="0" err="1">
+                    <a:solidFill>
+                      <a:srgbClr val="006400"/>
+                    </a:solidFill>
+                    <a:effectLst/>
+                    <a:latin typeface="Courier New" panose="02070309020205020404" pitchFamily="49" charset="0"/>
+                  </a:rPr>
+                  <a:t>blood</a:t>
+                </a:r>
+                <a:r>
+                  <a:rPr lang="en-US" sz="1400" b="0" i="0" dirty="0">
+                    <a:solidFill>
+                      <a:srgbClr val="006400"/>
+                    </a:solidFill>
+                    <a:effectLst/>
+                    <a:latin typeface="Courier New" panose="02070309020205020404" pitchFamily="49" charset="0"/>
+                  </a:rPr>
+                  <a:t> </a:t>
+                </a:r>
+                <a14:m>
+                  <m:oMath xmlns:m="http://schemas.openxmlformats.org/officeDocument/2006/math">
+                    <m:f>
+                      <m:fPr>
+                        <m:ctrlPr>
+                          <a:rPr lang="en-US" sz="1400" b="0" i="1" dirty="0" smtClean="0">
+                            <a:solidFill>
+                              <a:srgbClr val="006400"/>
+                            </a:solidFill>
+                            <a:latin typeface="Cambria Math" panose="02040503050406030204" pitchFamily="18" charset="0"/>
+                            <a:ea typeface="Cambria Math" panose="02040503050406030204" pitchFamily="18" charset="0"/>
+                          </a:rPr>
+                        </m:ctrlPr>
+                      </m:fPr>
+                      <m:num>
+                        <m:r>
+                          <a:rPr lang="en-US" sz="1400" i="1" dirty="0">
+                            <a:solidFill>
+                              <a:srgbClr val="006400"/>
+                            </a:solidFill>
+                            <a:latin typeface="Cambria Math" panose="02040503050406030204" pitchFamily="18" charset="0"/>
+                            <a:ea typeface="Cambria Math" panose="02040503050406030204" pitchFamily="18" charset="0"/>
+                          </a:rPr>
+                          <m:t>𝜕</m:t>
+                        </m:r>
+                        <m:r>
+                          <m:rPr>
+                            <m:sty m:val="p"/>
+                          </m:rPr>
+                          <a:rPr lang="en-US" sz="1400" b="0" i="0" dirty="0" smtClean="0">
+                            <a:solidFill>
+                              <a:srgbClr val="006400"/>
+                            </a:solidFill>
+                            <a:latin typeface="Cambria Math" panose="02040503050406030204" pitchFamily="18" charset="0"/>
+                            <a:ea typeface="Cambria Math" panose="02040503050406030204" pitchFamily="18" charset="0"/>
+                          </a:rPr>
+                          <m:t>pH</m:t>
+                        </m:r>
+                      </m:num>
+                      <m:den>
+                        <m:r>
+                          <a:rPr lang="en-US" sz="1400" i="1" dirty="0">
+                            <a:solidFill>
+                              <a:srgbClr val="006400"/>
+                            </a:solidFill>
+                            <a:latin typeface="Cambria Math" panose="02040503050406030204" pitchFamily="18" charset="0"/>
+                            <a:ea typeface="Cambria Math" panose="02040503050406030204" pitchFamily="18" charset="0"/>
+                          </a:rPr>
+                          <m:t>𝜕</m:t>
+                        </m:r>
+                        <m:r>
+                          <a:rPr lang="en-US" sz="1400" i="1" dirty="0">
+                            <a:solidFill>
+                              <a:srgbClr val="006400"/>
+                            </a:solidFill>
+                            <a:latin typeface="Cambria Math" panose="02040503050406030204" pitchFamily="18" charset="0"/>
+                            <a:ea typeface="Cambria Math" panose="02040503050406030204" pitchFamily="18" charset="0"/>
+                          </a:rPr>
+                          <m:t>𝐵𝐸𝑜𝑥</m:t>
+                        </m:r>
+                      </m:den>
+                    </m:f>
+                  </m:oMath>
+                </a14:m>
+                <a:endParaRPr lang="cs-CZ" sz="1800" b="0" i="0" dirty="0">
+                  <a:effectLst/>
+                  <a:latin typeface="Courier New" panose="02070309020205020404" pitchFamily="49" charset="0"/>
+                </a:endParaRPr>
+              </a:p>
+              <a:p>
+                <a:r>
+                  <a:rPr lang="cs-CZ" sz="1800" b="0" i="0" dirty="0">
+                    <a:effectLst/>
+                    <a:latin typeface="Courier New" panose="02070309020205020404" pitchFamily="49" charset="0"/>
+                  </a:rPr>
+                  <a:t>pH</a:t>
+                </a:r>
+                <a:r>
+                  <a:rPr lang="en-US" sz="1800" b="0" i="0" dirty="0">
+                    <a:effectLst/>
+                    <a:latin typeface="Courier New" panose="02070309020205020404" pitchFamily="49" charset="0"/>
+                  </a:rPr>
+                  <a:t>(</a:t>
+                </a:r>
+                <a:r>
+                  <a:rPr lang="en-US" sz="1800" b="0" i="0" dirty="0" err="1">
+                    <a:effectLst/>
+                    <a:latin typeface="Courier New" panose="02070309020205020404" pitchFamily="49" charset="0"/>
+                  </a:rPr>
+                  <a:t>beta,Beox</a:t>
+                </a:r>
+                <a:r>
+                  <a:rPr lang="en-US" sz="1800" b="0" i="0" dirty="0">
+                    <a:effectLst/>
+                    <a:latin typeface="Courier New" panose="02070309020205020404" pitchFamily="49" charset="0"/>
+                  </a:rPr>
+                  <a:t>,</a:t>
+                </a:r>
+                <a:r>
+                  <a:rPr lang="cs-CZ" sz="1800" b="0" i="0" dirty="0">
+                    <a:effectLst/>
+                    <a:latin typeface="Courier New" panose="02070309020205020404" pitchFamily="49" charset="0"/>
+                  </a:rPr>
+                  <a:t>sO2</a:t>
+                </a:r>
+                <a:r>
+                  <a:rPr lang="en-US" sz="1800" b="0" i="0" dirty="0">
+                    <a:effectLst/>
+                    <a:latin typeface="Courier New" panose="02070309020205020404" pitchFamily="49" charset="0"/>
+                  </a:rPr>
+                  <a:t>,</a:t>
+                </a:r>
+                <a:r>
+                  <a:rPr lang="cs-CZ" sz="1800" b="0" i="0" dirty="0">
+                    <a:effectLst/>
+                    <a:latin typeface="Courier New" panose="02070309020205020404" pitchFamily="49" charset="0"/>
+                  </a:rPr>
+                  <a:t>HCO3</a:t>
+                </a:r>
+                <a:r>
+                  <a:rPr lang="en-US" sz="1800" b="0" i="0" dirty="0">
+                    <a:effectLst/>
+                    <a:latin typeface="Courier New" panose="02070309020205020404" pitchFamily="49" charset="0"/>
+                  </a:rPr>
+                  <a:t>)</a:t>
+                </a:r>
+              </a:p>
+              <a:p>
+                <a:pPr lvl="1"/>
+                <a:r>
+                  <a:rPr lang="cs-CZ" sz="1400" b="0" i="0" dirty="0">
+                    <a:solidFill>
+                      <a:srgbClr val="006400"/>
+                    </a:solidFill>
+                    <a:effectLst/>
+                    <a:latin typeface="Courier New" panose="02070309020205020404" pitchFamily="49" charset="0"/>
+                  </a:rPr>
+                  <a:t>Van </a:t>
+                </a:r>
+                <a:r>
+                  <a:rPr lang="cs-CZ" sz="1400" b="0" i="0" dirty="0" err="1">
+                    <a:solidFill>
+                      <a:srgbClr val="006400"/>
+                    </a:solidFill>
+                    <a:effectLst/>
+                    <a:latin typeface="Courier New" panose="02070309020205020404" pitchFamily="49" charset="0"/>
+                  </a:rPr>
+                  <a:t>Slyke</a:t>
+                </a:r>
+                <a:r>
+                  <a:rPr lang="cs-CZ" sz="1400" b="0" i="0" dirty="0">
+                    <a:solidFill>
+                      <a:srgbClr val="006400"/>
+                    </a:solidFill>
+                    <a:effectLst/>
+                    <a:latin typeface="Courier New" panose="02070309020205020404" pitchFamily="49" charset="0"/>
+                  </a:rPr>
+                  <a:t> (</a:t>
+                </a:r>
+                <a:r>
+                  <a:rPr lang="cs-CZ" sz="1400" b="0" i="0" dirty="0" err="1">
+                    <a:solidFill>
+                      <a:srgbClr val="006400"/>
+                    </a:solidFill>
+                    <a:effectLst/>
+                    <a:latin typeface="Courier New" panose="02070309020205020404" pitchFamily="49" charset="0"/>
+                  </a:rPr>
+                  <a:t>simplified</a:t>
+                </a:r>
+                <a:r>
+                  <a:rPr lang="cs-CZ" sz="1400" b="0" i="0" dirty="0">
+                    <a:solidFill>
+                      <a:srgbClr val="006400"/>
+                    </a:solidFill>
+                    <a:effectLst/>
+                    <a:latin typeface="Courier New" panose="02070309020205020404" pitchFamily="49" charset="0"/>
+                  </a:rPr>
+                  <a:t> </a:t>
+                </a:r>
+                <a:r>
+                  <a:rPr lang="cs-CZ" sz="1400" b="0" i="0" dirty="0" err="1">
+                    <a:solidFill>
+                      <a:srgbClr val="006400"/>
+                    </a:solidFill>
+                    <a:effectLst/>
+                    <a:latin typeface="Courier New" panose="02070309020205020404" pitchFamily="49" charset="0"/>
+                  </a:rPr>
+                  <a:t>electroneutrality</a:t>
+                </a:r>
+                <a:r>
+                  <a:rPr lang="cs-CZ" sz="1400" b="0" i="0" dirty="0">
+                    <a:solidFill>
+                      <a:srgbClr val="006400"/>
+                    </a:solidFill>
+                    <a:effectLst/>
+                    <a:latin typeface="Courier New" panose="02070309020205020404" pitchFamily="49" charset="0"/>
+                  </a:rPr>
+                  <a:t> </a:t>
+                </a:r>
+                <a:r>
+                  <a:rPr lang="cs-CZ" sz="1400" b="0" i="0" dirty="0" err="1">
+                    <a:solidFill>
+                      <a:srgbClr val="006400"/>
+                    </a:solidFill>
+                    <a:effectLst/>
+                    <a:latin typeface="Courier New" panose="02070309020205020404" pitchFamily="49" charset="0"/>
+                  </a:rPr>
+                  <a:t>equation</a:t>
+                </a:r>
+                <a:r>
+                  <a:rPr lang="cs-CZ" sz="1400" b="0" i="0" dirty="0">
+                    <a:solidFill>
+                      <a:srgbClr val="006400"/>
+                    </a:solidFill>
+                    <a:effectLst/>
+                    <a:latin typeface="Courier New" panose="02070309020205020404" pitchFamily="49" charset="0"/>
+                  </a:rPr>
+                  <a:t>)</a:t>
+                </a:r>
+                <a:endParaRPr lang="cs-CZ" sz="1400" b="0" i="0" dirty="0">
+                  <a:effectLst/>
+                  <a:latin typeface="Segoe UI" panose="020B0502040204020203" pitchFamily="34" charset="0"/>
+                </a:endParaRPr>
+              </a:p>
+            </p:txBody>
+          </p:sp>
+        </mc:Choice>
+        <mc:Fallback xmlns="">
+          <p:sp>
+            <p:nvSpPr>
+              <p:cNvPr id="3" name="Content Placeholder 2">
+                <a:extLst>
+                  <a:ext uri="{FF2B5EF4-FFF2-40B4-BE49-F238E27FC236}">
+                    <a16:creationId xmlns:a16="http://schemas.microsoft.com/office/drawing/2014/main" id="{C172E84B-F30E-42F1-ADE5-3B37A97F5FF0}"/>
+                  </a:ext>
+                </a:extLst>
+              </p:cNvPr>
+              <p:cNvSpPr>
+                <a:spLocks noGrp="1" noRot="1" noChangeAspect="1" noMove="1" noResize="1" noEditPoints="1" noAdjustHandles="1" noChangeArrowheads="1" noChangeShapeType="1" noTextEdit="1"/>
+              </p:cNvSpPr>
+              <p:nvPr>
+                <p:ph idx="1"/>
+              </p:nvPr>
+            </p:nvSpPr>
+            <p:spPr>
+              <a:blipFill>
+                <a:blip r:embed="rId2"/>
+                <a:stretch>
+                  <a:fillRect l="-444" t="-809"/>
+                </a:stretch>
+              </a:blipFill>
+            </p:spPr>
+            <p:txBody>
+              <a:bodyPr/>
+              <a:lstStyle/>
+              <a:p>
+                <a:r>
+                  <a:rPr lang="cs-CZ">
+                    <a:noFill/>
+                  </a:rPr>
+                  <a:t> </a:t>
+                </a:r>
+              </a:p>
+            </p:txBody>
+          </p:sp>
+        </mc:Fallback>
+      </mc:AlternateContent>
+    </p:spTree>
+    <p:extLst>
+      <p:ext uri="{BB962C8B-B14F-4D97-AF65-F5344CB8AC3E}">
+        <p14:creationId xmlns:p14="http://schemas.microsoft.com/office/powerpoint/2010/main" val="1092089977"/>
+      </p:ext>
+    </p:extLst>
+  </p:cSld>
+  <p:clrMapOvr>
+    <a:masterClrMapping/>
+  </p:clrMapOvr>
+</p:sld>
+</file>
+
+<file path=ppt/slides/slide23.xml><?xml version="1.0" encoding="utf-8"?>
 <p:sld xmlns:a="http://schemas.openxmlformats.org/drawingml/2006/main" xmlns:r="http://schemas.openxmlformats.org/officeDocument/2006/relationships" xmlns:p="http://schemas.openxmlformats.org/presentationml/2006/main">
+  <p:cSld>
+    <p:spTree>
+      <p:nvGrpSpPr>
+        <p:cNvPr id="1" name=""/>
+        <p:cNvGrpSpPr/>
+        <p:nvPr/>
+      </p:nvGrpSpPr>
+      <p:grpSpPr>
+        <a:xfrm>
+          <a:off x="0" y="0"/>
+          <a:ext cx="0" cy="0"/>
+          <a:chOff x="0" y="0"/>
+          <a:chExt cx="0" cy="0"/>
+        </a:xfrm>
+      </p:grpSpPr>
+      <p:sp>
+        <p:nvSpPr>
+          <p:cNvPr id="2" name="Title 1">
+            <a:extLst>
+              <a:ext uri="{FF2B5EF4-FFF2-40B4-BE49-F238E27FC236}">
+                <a16:creationId xmlns:a16="http://schemas.microsoft.com/office/drawing/2014/main" id="{E8C37EDB-1E01-4D66-B886-00A7B2B1DB3B}"/>
+              </a:ext>
+            </a:extLst>
+          </p:cNvPr>
+          <p:cNvSpPr>
+            <a:spLocks noGrp="1"/>
+          </p:cNvSpPr>
+          <p:nvPr>
+            <p:ph type="title"/>
+          </p:nvPr>
+        </p:nvSpPr>
+        <p:spPr/>
+        <p:txBody>
+          <a:bodyPr/>
+          <a:lstStyle/>
+          <a:p>
+            <a:r>
+              <a:rPr lang="en-US" dirty="0"/>
+              <a:t>Behind</a:t>
+            </a:r>
+            <a:endParaRPr lang="cs-CZ" dirty="0"/>
+          </a:p>
+        </p:txBody>
+      </p:sp>
+      <p:sp>
+        <p:nvSpPr>
+          <p:cNvPr id="3" name="Content Placeholder 2">
+            <a:extLst>
+              <a:ext uri="{FF2B5EF4-FFF2-40B4-BE49-F238E27FC236}">
+                <a16:creationId xmlns:a16="http://schemas.microsoft.com/office/drawing/2014/main" id="{F6992F7C-4C85-4264-88BE-DCBD21C2E460}"/>
+              </a:ext>
+            </a:extLst>
+          </p:cNvPr>
+          <p:cNvSpPr>
+            <a:spLocks noGrp="1"/>
+          </p:cNvSpPr>
+          <p:nvPr>
+            <p:ph idx="1"/>
+          </p:nvPr>
+        </p:nvSpPr>
+        <p:spPr/>
+        <p:txBody>
+          <a:bodyPr>
+            <a:normAutofit fontScale="85000" lnSpcReduction="20000"/>
+          </a:bodyPr>
+          <a:lstStyle/>
+          <a:p>
+            <a:r>
+              <a:rPr lang="en-US" dirty="0"/>
+              <a:t>Hemoglobin – O2, CO2, H+, CO binding</a:t>
+            </a:r>
+          </a:p>
+          <a:p>
+            <a:endParaRPr lang="en-US" dirty="0"/>
+          </a:p>
+          <a:p>
+            <a:r>
+              <a:rPr lang="en-US" dirty="0"/>
+              <a:t>Henderson-Hasselbalch:  CO2 + H2O &lt;-&gt; HCO3- + H+</a:t>
+            </a:r>
+          </a:p>
+          <a:p>
+            <a:endParaRPr lang="en-US" dirty="0"/>
+          </a:p>
+          <a:p>
+            <a:r>
+              <a:rPr lang="en-US" dirty="0"/>
+              <a:t>Chloride shift:  Cl-, HCO3-</a:t>
+            </a:r>
+          </a:p>
+          <a:p>
+            <a:endParaRPr lang="en-US" dirty="0"/>
+          </a:p>
+          <a:p>
+            <a:r>
+              <a:rPr lang="en-US" dirty="0"/>
+              <a:t>Electroneutrality</a:t>
+            </a:r>
+          </a:p>
+          <a:p>
+            <a:endParaRPr lang="en-US" dirty="0"/>
+          </a:p>
+          <a:p>
+            <a:r>
+              <a:rPr lang="en-US" dirty="0"/>
+              <a:t>Acid-base</a:t>
+            </a:r>
+          </a:p>
+          <a:p>
+            <a:pPr marL="457200" lvl="1" indent="0">
+              <a:buNone/>
+            </a:pPr>
+            <a:endParaRPr lang="en-US" dirty="0"/>
+          </a:p>
+          <a:p>
+            <a:r>
+              <a:rPr lang="en-US" dirty="0"/>
+              <a:t>Osmosis</a:t>
+            </a:r>
+          </a:p>
+          <a:p>
+            <a:pPr marL="0" indent="0">
+              <a:buNone/>
+            </a:pPr>
+            <a:endParaRPr lang="en-US" dirty="0"/>
+          </a:p>
+          <a:p>
+            <a:pPr marL="457200" lvl="1" indent="0">
+              <a:buNone/>
+            </a:pPr>
+            <a:endParaRPr lang="en-US" dirty="0"/>
+          </a:p>
+          <a:p>
+            <a:pPr marL="457200" lvl="1" indent="0">
+              <a:buNone/>
+            </a:pPr>
+            <a:endParaRPr lang="en-US" dirty="0"/>
+          </a:p>
+        </p:txBody>
+      </p:sp>
+    </p:spTree>
+    <p:extLst>
+      <p:ext uri="{BB962C8B-B14F-4D97-AF65-F5344CB8AC3E}">
+        <p14:creationId xmlns:p14="http://schemas.microsoft.com/office/powerpoint/2010/main" val="2138366042"/>
+      </p:ext>
+    </p:extLst>
+  </p:cSld>
+  <p:clrMapOvr>
+    <a:masterClrMapping/>
+  </p:clrMapOvr>
+</p:sld>
+</file>
+
+<file path=ppt/slides/slide24.xml><?xml version="1.0" encoding="utf-8"?>
+<p:sld xmlns:a="http://schemas.openxmlformats.org/drawingml/2006/main" xmlns:r="http://schemas.openxmlformats.org/officeDocument/2006/relationships" xmlns:p="http://schemas.openxmlformats.org/presentationml/2006/main">
+  <p:cSld>
+    <p:spTree>
+      <p:nvGrpSpPr>
+        <p:cNvPr id="1" name=""/>
+        <p:cNvGrpSpPr/>
+        <p:nvPr/>
+      </p:nvGrpSpPr>
+      <p:grpSpPr>
+        <a:xfrm>
+          <a:off x="0" y="0"/>
+          <a:ext cx="0" cy="0"/>
+          <a:chOff x="0" y="0"/>
+          <a:chExt cx="0" cy="0"/>
+        </a:xfrm>
+      </p:grpSpPr>
+      <p:pic>
+        <p:nvPicPr>
+          <p:cNvPr id="9" name="Picture 8">
+            <a:extLst>
+              <a:ext uri="{FF2B5EF4-FFF2-40B4-BE49-F238E27FC236}">
+                <a16:creationId xmlns:a16="http://schemas.microsoft.com/office/drawing/2014/main" id="{B9C8BDFA-C775-4FCD-8C33-B5D7BCB7F1CC}"/>
+              </a:ext>
+            </a:extLst>
+          </p:cNvPr>
+          <p:cNvPicPr>
+            <a:picLocks noChangeAspect="1"/>
+          </p:cNvPicPr>
+          <p:nvPr/>
+        </p:nvPicPr>
+        <p:blipFill>
+          <a:blip r:embed="rId2">
+            <a:extLst>
+              <a:ext uri="{28A0092B-C50C-407E-A947-70E740481C1C}">
+                <a14:useLocalDpi xmlns:a14="http://schemas.microsoft.com/office/drawing/2010/main" val="0"/>
+              </a:ext>
+            </a:extLst>
+          </a:blip>
+          <a:stretch>
+            <a:fillRect/>
+          </a:stretch>
+        </p:blipFill>
+        <p:spPr>
+          <a:xfrm>
+            <a:off x="0" y="66323"/>
+            <a:ext cx="9144000" cy="6725353"/>
+          </a:xfrm>
+          <a:prstGeom prst="rect">
+            <a:avLst/>
+          </a:prstGeom>
+        </p:spPr>
+      </p:pic>
+      <p:sp>
+        <p:nvSpPr>
+          <p:cNvPr id="3" name="TextBox 2">
+            <a:extLst>
+              <a:ext uri="{FF2B5EF4-FFF2-40B4-BE49-F238E27FC236}">
+                <a16:creationId xmlns:a16="http://schemas.microsoft.com/office/drawing/2014/main" id="{4B6B0832-A857-467A-B2DB-A3595B923495}"/>
+              </a:ext>
+            </a:extLst>
+          </p:cNvPr>
+          <p:cNvSpPr txBox="1"/>
+          <p:nvPr/>
+        </p:nvSpPr>
+        <p:spPr>
+          <a:xfrm>
+            <a:off x="4644008" y="39954"/>
+            <a:ext cx="4392488" cy="1384995"/>
+          </a:xfrm>
+          <a:prstGeom prst="rect">
+            <a:avLst/>
+          </a:prstGeom>
+          <a:noFill/>
+        </p:spPr>
+        <p:txBody>
+          <a:bodyPr wrap="square" rtlCol="0">
+            <a:spAutoFit/>
+          </a:bodyPr>
+          <a:lstStyle/>
+          <a:p>
+            <a:r>
+              <a:rPr lang="cs-CZ" sz="1400" b="0" i="0" u="none" strike="noStrike" baseline="0" dirty="0">
+                <a:solidFill>
+                  <a:srgbClr val="000000"/>
+                </a:solidFill>
+                <a:latin typeface="Calibri" panose="020F0502020204030204" pitchFamily="34" charset="0"/>
+              </a:rPr>
+              <a:t>Mateják, Marek, Tomáš Kulhánek, and Stanislav Matoušek. 2015. “</a:t>
+            </a:r>
+            <a:r>
+              <a:rPr lang="cs-CZ" sz="1400" b="0" i="0" u="none" strike="noStrike" baseline="0" dirty="0" err="1">
+                <a:solidFill>
+                  <a:srgbClr val="000000"/>
+                </a:solidFill>
+                <a:latin typeface="Calibri" panose="020F0502020204030204" pitchFamily="34" charset="0"/>
+              </a:rPr>
+              <a:t>Adair-Based</a:t>
+            </a:r>
+            <a:r>
+              <a:rPr lang="cs-CZ" sz="1400" b="0" i="0" u="none" strike="noStrike" baseline="0" dirty="0">
+                <a:solidFill>
+                  <a:srgbClr val="000000"/>
+                </a:solidFill>
+                <a:latin typeface="Calibri" panose="020F0502020204030204" pitchFamily="34" charset="0"/>
+              </a:rPr>
+              <a:t> Hemoglobin </a:t>
+            </a:r>
+            <a:r>
+              <a:rPr lang="cs-CZ" sz="1400" b="0" i="0" u="none" strike="noStrike" baseline="0" dirty="0" err="1">
+                <a:solidFill>
+                  <a:srgbClr val="000000"/>
+                </a:solidFill>
+                <a:latin typeface="Calibri" panose="020F0502020204030204" pitchFamily="34" charset="0"/>
+              </a:rPr>
+              <a:t>Equilibrium</a:t>
+            </a:r>
+            <a:r>
+              <a:rPr lang="cs-CZ" sz="1400" b="0" i="0" u="none" strike="noStrike" baseline="0" dirty="0">
+                <a:solidFill>
+                  <a:srgbClr val="000000"/>
+                </a:solidFill>
+                <a:latin typeface="Calibri" panose="020F0502020204030204" pitchFamily="34" charset="0"/>
+              </a:rPr>
+              <a:t> </a:t>
+            </a:r>
+            <a:r>
+              <a:rPr lang="cs-CZ" sz="1400" b="0" i="0" u="none" strike="noStrike" baseline="0" dirty="0" err="1">
+                <a:solidFill>
+                  <a:srgbClr val="000000"/>
+                </a:solidFill>
+                <a:latin typeface="Calibri" panose="020F0502020204030204" pitchFamily="34" charset="0"/>
+              </a:rPr>
+              <a:t>with</a:t>
+            </a:r>
+            <a:r>
+              <a:rPr lang="cs-CZ" sz="1400" b="0" i="0" u="none" strike="noStrike" baseline="0" dirty="0">
+                <a:solidFill>
+                  <a:srgbClr val="000000"/>
+                </a:solidFill>
+                <a:latin typeface="Calibri" panose="020F0502020204030204" pitchFamily="34" charset="0"/>
+              </a:rPr>
+              <a:t> Oxygen, </a:t>
+            </a:r>
+            <a:r>
+              <a:rPr lang="cs-CZ" sz="1400" b="0" i="0" u="none" strike="noStrike" baseline="0" dirty="0" err="1">
+                <a:solidFill>
+                  <a:srgbClr val="000000"/>
+                </a:solidFill>
+                <a:latin typeface="Calibri" panose="020F0502020204030204" pitchFamily="34" charset="0"/>
+              </a:rPr>
+              <a:t>Carbon</a:t>
+            </a:r>
+            <a:r>
+              <a:rPr lang="cs-CZ" sz="1400" b="0" i="0" u="none" strike="noStrike" baseline="0" dirty="0">
+                <a:solidFill>
+                  <a:srgbClr val="000000"/>
+                </a:solidFill>
+                <a:latin typeface="Calibri" panose="020F0502020204030204" pitchFamily="34" charset="0"/>
+              </a:rPr>
+              <a:t> Dioxide and Hydrogen Ion </a:t>
+            </a:r>
+            <a:r>
+              <a:rPr lang="cs-CZ" sz="1400" b="0" i="0" u="none" strike="noStrike" baseline="0" dirty="0" err="1">
+                <a:solidFill>
+                  <a:srgbClr val="000000"/>
+                </a:solidFill>
+                <a:latin typeface="Calibri" panose="020F0502020204030204" pitchFamily="34" charset="0"/>
+              </a:rPr>
+              <a:t>Activity</a:t>
+            </a:r>
+            <a:r>
+              <a:rPr lang="cs-CZ" sz="1400" b="0" i="0" u="none" strike="noStrike" baseline="0" dirty="0">
+                <a:solidFill>
+                  <a:srgbClr val="000000"/>
+                </a:solidFill>
+                <a:latin typeface="Calibri" panose="020F0502020204030204" pitchFamily="34" charset="0"/>
+              </a:rPr>
+              <a:t>.” </a:t>
+            </a:r>
+            <a:r>
+              <a:rPr lang="cs-CZ" sz="1400" b="0" i="1" u="none" strike="noStrike" baseline="0" dirty="0" err="1">
+                <a:solidFill>
+                  <a:srgbClr val="000000"/>
+                </a:solidFill>
+                <a:latin typeface="Calibri" panose="020F0502020204030204" pitchFamily="34" charset="0"/>
+              </a:rPr>
+              <a:t>Scandinavian</a:t>
+            </a:r>
+            <a:r>
+              <a:rPr lang="cs-CZ" sz="1400" b="0" i="1" u="none" strike="noStrike" baseline="0" dirty="0">
+                <a:solidFill>
+                  <a:srgbClr val="000000"/>
+                </a:solidFill>
+                <a:latin typeface="Calibri" panose="020F0502020204030204" pitchFamily="34" charset="0"/>
+              </a:rPr>
+              <a:t> </a:t>
+            </a:r>
+            <a:r>
+              <a:rPr lang="cs-CZ" sz="1400" b="0" i="1" u="none" strike="noStrike" baseline="0" dirty="0" err="1">
+                <a:solidFill>
+                  <a:srgbClr val="000000"/>
+                </a:solidFill>
+                <a:latin typeface="Calibri" panose="020F0502020204030204" pitchFamily="34" charset="0"/>
+              </a:rPr>
+              <a:t>Journal</a:t>
+            </a:r>
+            <a:r>
+              <a:rPr lang="cs-CZ" sz="1400" b="0" i="1" u="none" strike="noStrike" baseline="0" dirty="0">
+                <a:solidFill>
+                  <a:srgbClr val="000000"/>
+                </a:solidFill>
+                <a:latin typeface="Calibri" panose="020F0502020204030204" pitchFamily="34" charset="0"/>
+              </a:rPr>
+              <a:t> </a:t>
+            </a:r>
+            <a:r>
+              <a:rPr lang="cs-CZ" sz="1400" b="0" i="1" u="none" strike="noStrike" baseline="0" dirty="0" err="1">
+                <a:solidFill>
+                  <a:srgbClr val="000000"/>
+                </a:solidFill>
+                <a:latin typeface="Calibri" panose="020F0502020204030204" pitchFamily="34" charset="0"/>
+              </a:rPr>
+              <a:t>of</a:t>
+            </a:r>
+            <a:r>
+              <a:rPr lang="cs-CZ" sz="1400" b="0" i="1" u="none" strike="noStrike" baseline="0" dirty="0">
+                <a:solidFill>
+                  <a:srgbClr val="000000"/>
+                </a:solidFill>
+                <a:latin typeface="Calibri" panose="020F0502020204030204" pitchFamily="34" charset="0"/>
+              </a:rPr>
+              <a:t> </a:t>
+            </a:r>
+            <a:r>
+              <a:rPr lang="cs-CZ" sz="1400" b="0" i="1" u="none" strike="noStrike" baseline="0" dirty="0" err="1">
+                <a:solidFill>
+                  <a:srgbClr val="000000"/>
+                </a:solidFill>
+                <a:latin typeface="Calibri" panose="020F0502020204030204" pitchFamily="34" charset="0"/>
+              </a:rPr>
+              <a:t>Clinical</a:t>
+            </a:r>
+            <a:r>
+              <a:rPr lang="cs-CZ" sz="1400" b="0" i="1" u="none" strike="noStrike" baseline="0" dirty="0">
+                <a:solidFill>
+                  <a:srgbClr val="000000"/>
+                </a:solidFill>
+                <a:latin typeface="Calibri" panose="020F0502020204030204" pitchFamily="34" charset="0"/>
+              </a:rPr>
+              <a:t> &amp; </a:t>
+            </a:r>
+            <a:r>
+              <a:rPr lang="cs-CZ" sz="1400" b="0" i="1" u="none" strike="noStrike" baseline="0" dirty="0" err="1">
+                <a:solidFill>
+                  <a:srgbClr val="000000"/>
+                </a:solidFill>
+                <a:latin typeface="Calibri" panose="020F0502020204030204" pitchFamily="34" charset="0"/>
+              </a:rPr>
+              <a:t>Laboratory</a:t>
+            </a:r>
+            <a:r>
+              <a:rPr lang="cs-CZ" sz="1400" b="0" i="1" u="none" strike="noStrike" baseline="0" dirty="0">
+                <a:solidFill>
+                  <a:srgbClr val="000000"/>
+                </a:solidFill>
+                <a:latin typeface="Calibri" panose="020F0502020204030204" pitchFamily="34" charset="0"/>
+              </a:rPr>
+              <a:t> </a:t>
+            </a:r>
+            <a:r>
+              <a:rPr lang="cs-CZ" sz="1400" b="0" i="1" u="none" strike="noStrike" baseline="0" dirty="0" err="1">
+                <a:solidFill>
+                  <a:srgbClr val="000000"/>
+                </a:solidFill>
+                <a:latin typeface="Calibri" panose="020F0502020204030204" pitchFamily="34" charset="0"/>
+              </a:rPr>
+              <a:t>Investigation</a:t>
+            </a:r>
+            <a:r>
+              <a:rPr lang="cs-CZ" sz="1400" b="0" i="1" u="none" strike="noStrike" baseline="0" dirty="0">
+                <a:solidFill>
+                  <a:srgbClr val="000000"/>
+                </a:solidFill>
+                <a:latin typeface="Calibri" panose="020F0502020204030204" pitchFamily="34" charset="0"/>
+              </a:rPr>
+              <a:t> </a:t>
+            </a:r>
+            <a:r>
+              <a:rPr lang="cs-CZ" sz="1400" b="0" i="0" u="none" strike="noStrike" baseline="0" dirty="0">
+                <a:solidFill>
+                  <a:srgbClr val="000000"/>
+                </a:solidFill>
+                <a:latin typeface="Calibri" panose="020F0502020204030204" pitchFamily="34" charset="0"/>
+              </a:rPr>
+              <a:t>75 (2): 113–20. https://doi.org/10.3109/00365513.2014.984320. </a:t>
+            </a:r>
+            <a:endParaRPr lang="cs-CZ" sz="1400" dirty="0"/>
+          </a:p>
+        </p:txBody>
+      </p:sp>
+    </p:spTree>
+    <p:extLst>
+      <p:ext uri="{BB962C8B-B14F-4D97-AF65-F5344CB8AC3E}">
+        <p14:creationId xmlns:p14="http://schemas.microsoft.com/office/powerpoint/2010/main" val="1984133094"/>
+      </p:ext>
+    </p:extLst>
+  </p:cSld>
+  <p:clrMapOvr>
+    <a:masterClrMapping/>
+  </p:clrMapOvr>
+</p:sld>
+</file>
+
+<file path=ppt/slides/slide25.xml><?xml version="1.0" encoding="utf-8"?>
+<p:sld xmlns:a="http://schemas.openxmlformats.org/drawingml/2006/main" xmlns:r="http://schemas.openxmlformats.org/officeDocument/2006/relationships" xmlns:p="http://schemas.openxmlformats.org/presentationml/2006/main" show="0">
   <p:cSld>
     <p:spTree>
       <p:nvGrpSpPr>
@@ -4640,7 +6981,351 @@
 </p:sld>
 </file>
 
-<file path=ppt/slides/slide21.xml><?xml version="1.0" encoding="utf-8"?>
+<file path=ppt/slides/slide26.xml><?xml version="1.0" encoding="utf-8"?>
+<p:sld xmlns:a="http://schemas.openxmlformats.org/drawingml/2006/main" xmlns:r="http://schemas.openxmlformats.org/officeDocument/2006/relationships" xmlns:p="http://schemas.openxmlformats.org/presentationml/2006/main">
+  <p:cSld>
+    <p:spTree>
+      <p:nvGrpSpPr>
+        <p:cNvPr id="1" name=""/>
+        <p:cNvGrpSpPr/>
+        <p:nvPr/>
+      </p:nvGrpSpPr>
+      <p:grpSpPr>
+        <a:xfrm>
+          <a:off x="0" y="0"/>
+          <a:ext cx="0" cy="0"/>
+          <a:chOff x="0" y="0"/>
+          <a:chExt cx="0" cy="0"/>
+        </a:xfrm>
+      </p:grpSpPr>
+      <p:sp>
+        <p:nvSpPr>
+          <p:cNvPr id="2" name="Title 1">
+            <a:extLst>
+              <a:ext uri="{FF2B5EF4-FFF2-40B4-BE49-F238E27FC236}">
+                <a16:creationId xmlns:a16="http://schemas.microsoft.com/office/drawing/2014/main" id="{3A6852ED-CA0D-49C7-8ABA-38DBF1DD976F}"/>
+              </a:ext>
+            </a:extLst>
+          </p:cNvPr>
+          <p:cNvSpPr>
+            <a:spLocks noGrp="1"/>
+          </p:cNvSpPr>
+          <p:nvPr>
+            <p:ph type="title"/>
+          </p:nvPr>
+        </p:nvSpPr>
+        <p:spPr/>
+        <p:txBody>
+          <a:bodyPr/>
+          <a:lstStyle/>
+          <a:p>
+            <a:r>
+              <a:rPr lang="en-US" dirty="0"/>
+              <a:t>Respiratory unit</a:t>
+            </a:r>
+            <a:endParaRPr lang="cs-CZ" dirty="0"/>
+          </a:p>
+        </p:txBody>
+      </p:sp>
+      <p:pic>
+        <p:nvPicPr>
+          <p:cNvPr id="5" name="Content Placeholder 4">
+            <a:extLst>
+              <a:ext uri="{FF2B5EF4-FFF2-40B4-BE49-F238E27FC236}">
+                <a16:creationId xmlns:a16="http://schemas.microsoft.com/office/drawing/2014/main" id="{3204423B-F7CF-4253-BC01-B25ABD8E0957}"/>
+              </a:ext>
+            </a:extLst>
+          </p:cNvPr>
+          <p:cNvPicPr>
+            <a:picLocks noGrp="1" noChangeAspect="1"/>
+          </p:cNvPicPr>
+          <p:nvPr>
+            <p:ph idx="1"/>
+          </p:nvPr>
+        </p:nvPicPr>
+        <p:blipFill>
+          <a:blip r:embed="rId2"/>
+          <a:stretch>
+            <a:fillRect/>
+          </a:stretch>
+        </p:blipFill>
+        <p:spPr>
+          <a:xfrm>
+            <a:off x="1466282" y="1600200"/>
+            <a:ext cx="6211435" cy="4525963"/>
+          </a:xfrm>
+        </p:spPr>
+      </p:pic>
+    </p:spTree>
+    <p:extLst>
+      <p:ext uri="{BB962C8B-B14F-4D97-AF65-F5344CB8AC3E}">
+        <p14:creationId xmlns:p14="http://schemas.microsoft.com/office/powerpoint/2010/main" val="516187709"/>
+      </p:ext>
+    </p:extLst>
+  </p:cSld>
+  <p:clrMapOvr>
+    <a:masterClrMapping/>
+  </p:clrMapOvr>
+</p:sld>
+</file>
+
+<file path=ppt/slides/slide27.xml><?xml version="1.0" encoding="utf-8"?>
+<p:sld xmlns:a="http://schemas.openxmlformats.org/drawingml/2006/main" xmlns:r="http://schemas.openxmlformats.org/officeDocument/2006/relationships" xmlns:p="http://schemas.openxmlformats.org/presentationml/2006/main">
+  <p:cSld>
+    <p:spTree>
+      <p:nvGrpSpPr>
+        <p:cNvPr id="1" name=""/>
+        <p:cNvGrpSpPr/>
+        <p:nvPr/>
+      </p:nvGrpSpPr>
+      <p:grpSpPr>
+        <a:xfrm>
+          <a:off x="0" y="0"/>
+          <a:ext cx="0" cy="0"/>
+          <a:chOff x="0" y="0"/>
+          <a:chExt cx="0" cy="0"/>
+        </a:xfrm>
+      </p:grpSpPr>
+      <p:sp>
+        <p:nvSpPr>
+          <p:cNvPr id="2" name="Title 1">
+            <a:extLst>
+              <a:ext uri="{FF2B5EF4-FFF2-40B4-BE49-F238E27FC236}">
+                <a16:creationId xmlns:a16="http://schemas.microsoft.com/office/drawing/2014/main" id="{1438D8FC-9FD6-41F7-82FD-239A5952535E}"/>
+              </a:ext>
+            </a:extLst>
+          </p:cNvPr>
+          <p:cNvSpPr>
+            <a:spLocks noGrp="1"/>
+          </p:cNvSpPr>
+          <p:nvPr>
+            <p:ph type="title"/>
+          </p:nvPr>
+        </p:nvSpPr>
+        <p:spPr/>
+        <p:txBody>
+          <a:bodyPr/>
+          <a:lstStyle/>
+          <a:p>
+            <a:endParaRPr lang="cs-CZ"/>
+          </a:p>
+        </p:txBody>
+      </p:sp>
+      <p:sp>
+        <p:nvSpPr>
+          <p:cNvPr id="3" name="Content Placeholder 2">
+            <a:extLst>
+              <a:ext uri="{FF2B5EF4-FFF2-40B4-BE49-F238E27FC236}">
+                <a16:creationId xmlns:a16="http://schemas.microsoft.com/office/drawing/2014/main" id="{02380312-6A7C-4293-8ED8-2F845705A70D}"/>
+              </a:ext>
+            </a:extLst>
+          </p:cNvPr>
+          <p:cNvSpPr>
+            <a:spLocks noGrp="1"/>
+          </p:cNvSpPr>
+          <p:nvPr>
+            <p:ph idx="1"/>
+          </p:nvPr>
+        </p:nvSpPr>
+        <p:spPr/>
+        <p:txBody>
+          <a:bodyPr/>
+          <a:lstStyle/>
+          <a:p>
+            <a:endParaRPr lang="cs-CZ"/>
+          </a:p>
+        </p:txBody>
+      </p:sp>
+      <p:pic>
+        <p:nvPicPr>
+          <p:cNvPr id="5" name="Picture 4">
+            <a:extLst>
+              <a:ext uri="{FF2B5EF4-FFF2-40B4-BE49-F238E27FC236}">
+                <a16:creationId xmlns:a16="http://schemas.microsoft.com/office/drawing/2014/main" id="{A1EAF77A-9D47-4020-9F39-10D3A7633AFA}"/>
+              </a:ext>
+            </a:extLst>
+          </p:cNvPr>
+          <p:cNvPicPr>
+            <a:picLocks noChangeAspect="1"/>
+          </p:cNvPicPr>
+          <p:nvPr/>
+        </p:nvPicPr>
+        <p:blipFill>
+          <a:blip r:embed="rId2"/>
+          <a:stretch>
+            <a:fillRect/>
+          </a:stretch>
+        </p:blipFill>
+        <p:spPr>
+          <a:xfrm>
+            <a:off x="579664" y="0"/>
+            <a:ext cx="7984671" cy="6858000"/>
+          </a:xfrm>
+          <a:prstGeom prst="rect">
+            <a:avLst/>
+          </a:prstGeom>
+        </p:spPr>
+      </p:pic>
+    </p:spTree>
+    <p:extLst>
+      <p:ext uri="{BB962C8B-B14F-4D97-AF65-F5344CB8AC3E}">
+        <p14:creationId xmlns:p14="http://schemas.microsoft.com/office/powerpoint/2010/main" val="3174281765"/>
+      </p:ext>
+    </p:extLst>
+  </p:cSld>
+  <p:clrMapOvr>
+    <a:masterClrMapping/>
+  </p:clrMapOvr>
+</p:sld>
+</file>
+
+<file path=ppt/slides/slide28.xml><?xml version="1.0" encoding="utf-8"?>
+<p:sld xmlns:a="http://schemas.openxmlformats.org/drawingml/2006/main" xmlns:r="http://schemas.openxmlformats.org/officeDocument/2006/relationships" xmlns:p="http://schemas.openxmlformats.org/presentationml/2006/main">
+  <p:cSld>
+    <p:spTree>
+      <p:nvGrpSpPr>
+        <p:cNvPr id="1" name=""/>
+        <p:cNvGrpSpPr/>
+        <p:nvPr/>
+      </p:nvGrpSpPr>
+      <p:grpSpPr>
+        <a:xfrm>
+          <a:off x="0" y="0"/>
+          <a:ext cx="0" cy="0"/>
+          <a:chOff x="0" y="0"/>
+          <a:chExt cx="0" cy="0"/>
+        </a:xfrm>
+      </p:grpSpPr>
+      <p:sp>
+        <p:nvSpPr>
+          <p:cNvPr id="2" name="Title 1">
+            <a:extLst>
+              <a:ext uri="{FF2B5EF4-FFF2-40B4-BE49-F238E27FC236}">
+                <a16:creationId xmlns:a16="http://schemas.microsoft.com/office/drawing/2014/main" id="{793B913E-9ECE-4BAA-9BB4-D2A899F158DE}"/>
+              </a:ext>
+            </a:extLst>
+          </p:cNvPr>
+          <p:cNvSpPr>
+            <a:spLocks noGrp="1"/>
+          </p:cNvSpPr>
+          <p:nvPr>
+            <p:ph type="title"/>
+          </p:nvPr>
+        </p:nvSpPr>
+        <p:spPr/>
+        <p:txBody>
+          <a:bodyPr>
+            <a:normAutofit/>
+          </a:bodyPr>
+          <a:lstStyle/>
+          <a:p>
+            <a:r>
+              <a:rPr lang="en-US" dirty="0"/>
+              <a:t>Lungs pressure-volume relation</a:t>
+            </a:r>
+            <a:endParaRPr lang="cs-CZ" dirty="0"/>
+          </a:p>
+        </p:txBody>
+      </p:sp>
+      <p:sp>
+        <p:nvSpPr>
+          <p:cNvPr id="3" name="Content Placeholder 2">
+            <a:extLst>
+              <a:ext uri="{FF2B5EF4-FFF2-40B4-BE49-F238E27FC236}">
+                <a16:creationId xmlns:a16="http://schemas.microsoft.com/office/drawing/2014/main" id="{E01C005C-7A93-407B-B831-CB9A3163F893}"/>
+              </a:ext>
+            </a:extLst>
+          </p:cNvPr>
+          <p:cNvSpPr>
+            <a:spLocks noGrp="1"/>
+          </p:cNvSpPr>
+          <p:nvPr>
+            <p:ph idx="1"/>
+          </p:nvPr>
+        </p:nvSpPr>
+        <p:spPr/>
+        <p:txBody>
+          <a:bodyPr/>
+          <a:lstStyle/>
+          <a:p>
+            <a:endParaRPr lang="cs-CZ"/>
+          </a:p>
+        </p:txBody>
+      </p:sp>
+      <p:pic>
+        <p:nvPicPr>
+          <p:cNvPr id="5" name="Picture 4">
+            <a:extLst>
+              <a:ext uri="{FF2B5EF4-FFF2-40B4-BE49-F238E27FC236}">
+                <a16:creationId xmlns:a16="http://schemas.microsoft.com/office/drawing/2014/main" id="{18566325-2376-44EA-AA98-BFE14BBECAB6}"/>
+              </a:ext>
+            </a:extLst>
+          </p:cNvPr>
+          <p:cNvPicPr>
+            <a:picLocks noChangeAspect="1"/>
+          </p:cNvPicPr>
+          <p:nvPr/>
+        </p:nvPicPr>
+        <p:blipFill>
+          <a:blip r:embed="rId2"/>
+          <a:stretch>
+            <a:fillRect/>
+          </a:stretch>
+        </p:blipFill>
+        <p:spPr>
+          <a:xfrm>
+            <a:off x="449898" y="1319651"/>
+            <a:ext cx="8164064" cy="5087060"/>
+          </a:xfrm>
+          <a:prstGeom prst="rect">
+            <a:avLst/>
+          </a:prstGeom>
+        </p:spPr>
+      </p:pic>
+      <p:pic>
+        <p:nvPicPr>
+          <p:cNvPr id="9" name="Picture 8">
+            <a:extLst>
+              <a:ext uri="{FF2B5EF4-FFF2-40B4-BE49-F238E27FC236}">
+                <a16:creationId xmlns:a16="http://schemas.microsoft.com/office/drawing/2014/main" id="{8327E37A-056B-40A4-9A4D-FD625E00B954}"/>
+              </a:ext>
+            </a:extLst>
+          </p:cNvPr>
+          <p:cNvPicPr>
+            <a:picLocks noChangeAspect="1"/>
+          </p:cNvPicPr>
+          <p:nvPr/>
+        </p:nvPicPr>
+        <p:blipFill>
+          <a:blip r:embed="rId3"/>
+          <a:stretch>
+            <a:fillRect/>
+          </a:stretch>
+        </p:blipFill>
+        <p:spPr>
+          <a:xfrm>
+            <a:off x="4788024" y="3869267"/>
+            <a:ext cx="3219899" cy="1505160"/>
+          </a:xfrm>
+          <a:prstGeom prst="rect">
+            <a:avLst/>
+          </a:prstGeom>
+        </p:spPr>
+      </p:pic>
+    </p:spTree>
+    <p:extLst>
+      <p:ext uri="{BB962C8B-B14F-4D97-AF65-F5344CB8AC3E}">
+        <p14:creationId xmlns:p14="http://schemas.microsoft.com/office/powerpoint/2010/main" val="1640666263"/>
+      </p:ext>
+    </p:extLst>
+  </p:cSld>
+  <p:clrMapOvr>
+    <a:masterClrMapping/>
+  </p:clrMapOvr>
+</p:sld>
+</file>
+
+<file path=ppt/slides/slide29.xml><?xml version="1.0" encoding="utf-8"?>
 <p:sld xmlns:a="http://schemas.openxmlformats.org/drawingml/2006/main" xmlns:r="http://schemas.openxmlformats.org/officeDocument/2006/relationships" xmlns:p="http://schemas.openxmlformats.org/presentationml/2006/main">
   <p:cSld>
     <p:spTree>
@@ -4802,7 +7487,7 @@
 </p:sld>
 </file>
 
-<file path=ppt/slides/slide22.xml><?xml version="1.0" encoding="utf-8"?>
+<file path=ppt/slides/slide3.xml><?xml version="1.0" encoding="utf-8"?>
 <p:sld xmlns:a="http://schemas.openxmlformats.org/drawingml/2006/main" xmlns:r="http://schemas.openxmlformats.org/officeDocument/2006/relationships" xmlns:p="http://schemas.openxmlformats.org/presentationml/2006/main">
   <p:cSld>
     <p:spTree>
@@ -4821,13 +7506,7 @@
       </p:grpSpPr>
       <p:sp>
         <p:nvSpPr>
-          <p:cNvPr id="2" name="Title 1">
-            <a:extLst>
-              <a:ext uri="{FF2B5EF4-FFF2-40B4-BE49-F238E27FC236}">
-                <a16:creationId xmlns:a16="http://schemas.microsoft.com/office/drawing/2014/main" id="{3A6852ED-CA0D-49C7-8ABA-38DBF1DD976F}"/>
-              </a:ext>
-            </a:extLst>
-          </p:cNvPr>
+          <p:cNvPr id="2" name="Nadpis 1"/>
           <p:cNvSpPr>
             <a:spLocks noGrp="1"/>
           </p:cNvSpPr>
@@ -4842,117 +7521,48 @@
           <a:p>
             <a:r>
               <a:rPr lang="en-US" dirty="0"/>
-              <a:t>Respiratory unit</a:t>
+              <a:t>Physiolibrary Structure</a:t>
             </a:r>
             <a:endParaRPr lang="cs-CZ" dirty="0"/>
           </a:p>
         </p:txBody>
       </p:sp>
-      <p:pic>
-        <p:nvPicPr>
-          <p:cNvPr id="5" name="Content Placeholder 4">
-            <a:extLst>
-              <a:ext uri="{FF2B5EF4-FFF2-40B4-BE49-F238E27FC236}">
-                <a16:creationId xmlns:a16="http://schemas.microsoft.com/office/drawing/2014/main" id="{3204423B-F7CF-4253-BC01-B25ABD8E0957}"/>
-              </a:ext>
-            </a:extLst>
-          </p:cNvPr>
-          <p:cNvPicPr>
-            <a:picLocks noGrp="1" noChangeAspect="1"/>
-          </p:cNvPicPr>
-          <p:nvPr>
-            <p:ph idx="1"/>
-          </p:nvPr>
-        </p:nvPicPr>
-        <p:blipFill>
-          <a:blip r:embed="rId2"/>
-          <a:stretch>
-            <a:fillRect/>
-          </a:stretch>
-        </p:blipFill>
+      <p:sp>
+        <p:nvSpPr>
+          <p:cNvPr id="11" name="Šrafovaná šipka doprava 10"/>
+          <p:cNvSpPr/>
+          <p:nvPr/>
+        </p:nvSpPr>
         <p:spPr>
-          <a:xfrm>
-            <a:off x="1466282" y="1600200"/>
-            <a:ext cx="6211435" cy="4525963"/>
+          <a:xfrm rot="20707871">
+            <a:off x="2718798" y="3126597"/>
+            <a:ext cx="973507" cy="360040"/>
           </a:xfrm>
+          <a:prstGeom prst="stripedRightArrow">
+            <a:avLst/>
+          </a:prstGeom>
         </p:spPr>
-      </p:pic>
-    </p:spTree>
-    <p:extLst>
-      <p:ext uri="{BB962C8B-B14F-4D97-AF65-F5344CB8AC3E}">
-        <p14:creationId xmlns:p14="http://schemas.microsoft.com/office/powerpoint/2010/main" val="516187709"/>
-      </p:ext>
-    </p:extLst>
-  </p:cSld>
-  <p:clrMapOvr>
-    <a:masterClrMapping/>
-  </p:clrMapOvr>
-</p:sld>
-</file>
-
-<file path=ppt/slides/slide23.xml><?xml version="1.0" encoding="utf-8"?>
-<p:sld xmlns:a="http://schemas.openxmlformats.org/drawingml/2006/main" xmlns:r="http://schemas.openxmlformats.org/officeDocument/2006/relationships" xmlns:p="http://schemas.openxmlformats.org/presentationml/2006/main">
-  <p:cSld>
-    <p:spTree>
-      <p:nvGrpSpPr>
-        <p:cNvPr id="1" name=""/>
-        <p:cNvGrpSpPr/>
-        <p:nvPr/>
-      </p:nvGrpSpPr>
-      <p:grpSpPr>
-        <a:xfrm>
-          <a:off x="0" y="0"/>
-          <a:ext cx="0" cy="0"/>
-          <a:chOff x="0" y="0"/>
-          <a:chExt cx="0" cy="0"/>
-        </a:xfrm>
-      </p:grpSpPr>
-      <p:sp>
-        <p:nvSpPr>
-          <p:cNvPr id="2" name="Title 1">
-            <a:extLst>
-              <a:ext uri="{FF2B5EF4-FFF2-40B4-BE49-F238E27FC236}">
-                <a16:creationId xmlns:a16="http://schemas.microsoft.com/office/drawing/2014/main" id="{1438D8FC-9FD6-41F7-82FD-239A5952535E}"/>
-              </a:ext>
-            </a:extLst>
-          </p:cNvPr>
-          <p:cNvSpPr>
-            <a:spLocks noGrp="1"/>
-          </p:cNvSpPr>
-          <p:nvPr>
-            <p:ph type="title"/>
-          </p:nvPr>
-        </p:nvSpPr>
-        <p:spPr/>
-        <p:txBody>
-          <a:bodyPr/>
-          <a:lstStyle/>
-          <a:p>
-            <a:endParaRPr lang="cs-CZ"/>
-          </a:p>
-        </p:txBody>
-      </p:sp>
-      <p:sp>
-        <p:nvSpPr>
-          <p:cNvPr id="3" name="Content Placeholder 2">
-            <a:extLst>
-              <a:ext uri="{FF2B5EF4-FFF2-40B4-BE49-F238E27FC236}">
-                <a16:creationId xmlns:a16="http://schemas.microsoft.com/office/drawing/2014/main" id="{02380312-6A7C-4293-8ED8-2F845705A70D}"/>
-              </a:ext>
-            </a:extLst>
-          </p:cNvPr>
-          <p:cNvSpPr>
-            <a:spLocks noGrp="1"/>
-          </p:cNvSpPr>
-          <p:nvPr>
-            <p:ph idx="1"/>
-          </p:nvPr>
-        </p:nvSpPr>
-        <p:spPr/>
-        <p:txBody>
-          <a:bodyPr/>
-          <a:lstStyle/>
-          <a:p>
+        <p:style>
+          <a:lnRef idx="2">
+            <a:schemeClr val="accent1">
+              <a:shade val="50000"/>
+            </a:schemeClr>
+          </a:lnRef>
+          <a:fillRef idx="1">
+            <a:schemeClr val="accent1"/>
+          </a:fillRef>
+          <a:effectRef idx="0">
+            <a:schemeClr val="accent1"/>
+          </a:effectRef>
+          <a:fontRef idx="minor">
+            <a:schemeClr val="lt1"/>
+          </a:fontRef>
+        </p:style>
+        <p:txBody>
+          <a:bodyPr rtlCol="0" anchor="ctr"/>
+          <a:lstStyle/>
+          <a:p>
+            <a:pPr algn="ctr"/>
             <a:endParaRPr lang="cs-CZ"/>
           </a:p>
         </p:txBody>
@@ -4962,7 +7572,7 @@
           <p:cNvPr id="5" name="Picture 4">
             <a:extLst>
               <a:ext uri="{FF2B5EF4-FFF2-40B4-BE49-F238E27FC236}">
-                <a16:creationId xmlns:a16="http://schemas.microsoft.com/office/drawing/2014/main" id="{A1EAF77A-9D47-4020-9F39-10D3A7633AFA}"/>
+                <a16:creationId xmlns:a16="http://schemas.microsoft.com/office/drawing/2014/main" id="{6B72E9B1-8E34-4C92-8404-FCFD12F23E8C}"/>
               </a:ext>
             </a:extLst>
           </p:cNvPr>
@@ -4979,20 +7589,197 @@
         </p:blipFill>
         <p:spPr>
           <a:xfrm>
-            <a:off x="579664" y="0"/>
-            <a:ext cx="7984671" cy="6858000"/>
+            <a:off x="1107531" y="2721485"/>
+            <a:ext cx="1581371" cy="2943636"/>
           </a:xfrm>
           <a:prstGeom prst="rect">
             <a:avLst/>
           </a:prstGeom>
         </p:spPr>
       </p:pic>
+      <p:pic>
+        <p:nvPicPr>
+          <p:cNvPr id="7" name="Picture 6">
+            <a:extLst>
+              <a:ext uri="{FF2B5EF4-FFF2-40B4-BE49-F238E27FC236}">
+                <a16:creationId xmlns:a16="http://schemas.microsoft.com/office/drawing/2014/main" id="{76E70474-AD66-47DF-93CF-2E4629241D61}"/>
+              </a:ext>
+            </a:extLst>
+          </p:cNvPr>
+          <p:cNvPicPr>
+            <a:picLocks noChangeAspect="1"/>
+          </p:cNvPicPr>
+          <p:nvPr/>
+        </p:nvPicPr>
+        <p:blipFill>
+          <a:blip r:embed="rId3"/>
+          <a:stretch>
+            <a:fillRect/>
+          </a:stretch>
+        </p:blipFill>
+        <p:spPr>
+          <a:xfrm>
+            <a:off x="3767025" y="1700808"/>
+            <a:ext cx="1609950" cy="2181529"/>
+          </a:xfrm>
+          <a:prstGeom prst="rect">
+            <a:avLst/>
+          </a:prstGeom>
+        </p:spPr>
+      </p:pic>
+      <p:sp>
+        <p:nvSpPr>
+          <p:cNvPr id="12" name="Šrafovaná šipka doprava 10">
+            <a:extLst>
+              <a:ext uri="{FF2B5EF4-FFF2-40B4-BE49-F238E27FC236}">
+                <a16:creationId xmlns:a16="http://schemas.microsoft.com/office/drawing/2014/main" id="{686F25E8-A318-4BAE-9C97-9D15853554BF}"/>
+              </a:ext>
+            </a:extLst>
+          </p:cNvPr>
+          <p:cNvSpPr/>
+          <p:nvPr/>
+        </p:nvSpPr>
+        <p:spPr>
+          <a:xfrm rot="2564001">
+            <a:off x="2723458" y="3772833"/>
+            <a:ext cx="648072" cy="360040"/>
+          </a:xfrm>
+          <a:prstGeom prst="stripedRightArrow">
+            <a:avLst/>
+          </a:prstGeom>
+        </p:spPr>
+        <p:style>
+          <a:lnRef idx="2">
+            <a:schemeClr val="accent1">
+              <a:shade val="50000"/>
+            </a:schemeClr>
+          </a:lnRef>
+          <a:fillRef idx="1">
+            <a:schemeClr val="accent1"/>
+          </a:fillRef>
+          <a:effectRef idx="0">
+            <a:schemeClr val="accent1"/>
+          </a:effectRef>
+          <a:fontRef idx="minor">
+            <a:schemeClr val="lt1"/>
+          </a:fontRef>
+        </p:style>
+        <p:txBody>
+          <a:bodyPr rtlCol="0" anchor="ctr"/>
+          <a:lstStyle/>
+          <a:p>
+            <a:pPr algn="ctr"/>
+            <a:endParaRPr lang="cs-CZ"/>
+          </a:p>
+        </p:txBody>
+      </p:sp>
+      <p:pic>
+        <p:nvPicPr>
+          <p:cNvPr id="10" name="Picture 9">
+            <a:extLst>
+              <a:ext uri="{FF2B5EF4-FFF2-40B4-BE49-F238E27FC236}">
+                <a16:creationId xmlns:a16="http://schemas.microsoft.com/office/drawing/2014/main" id="{2A3CD6B5-ED8D-4553-B2FD-B2943385B8DB}"/>
+              </a:ext>
+            </a:extLst>
+          </p:cNvPr>
+          <p:cNvPicPr>
+            <a:picLocks noChangeAspect="1"/>
+          </p:cNvPicPr>
+          <p:nvPr/>
+        </p:nvPicPr>
+        <p:blipFill>
+          <a:blip r:embed="rId4"/>
+          <a:stretch>
+            <a:fillRect/>
+          </a:stretch>
+        </p:blipFill>
+        <p:spPr>
+          <a:xfrm>
+            <a:off x="3520402" y="4012501"/>
+            <a:ext cx="1467055" cy="1581371"/>
+          </a:xfrm>
+          <a:prstGeom prst="rect">
+            <a:avLst/>
+          </a:prstGeom>
+        </p:spPr>
+      </p:pic>
+      <p:pic>
+        <p:nvPicPr>
+          <p:cNvPr id="18" name="Picture 17">
+            <a:extLst>
+              <a:ext uri="{FF2B5EF4-FFF2-40B4-BE49-F238E27FC236}">
+                <a16:creationId xmlns:a16="http://schemas.microsoft.com/office/drawing/2014/main" id="{5C3EE3D1-5000-46B0-BC0F-31461F6A6117}"/>
+              </a:ext>
+            </a:extLst>
+          </p:cNvPr>
+          <p:cNvPicPr>
+            <a:picLocks noChangeAspect="1"/>
+          </p:cNvPicPr>
+          <p:nvPr/>
+        </p:nvPicPr>
+        <p:blipFill>
+          <a:blip r:embed="rId5"/>
+          <a:stretch>
+            <a:fillRect/>
+          </a:stretch>
+        </p:blipFill>
+        <p:spPr>
+          <a:xfrm>
+            <a:off x="6228184" y="2575939"/>
+            <a:ext cx="2019582" cy="3458058"/>
+          </a:xfrm>
+          <a:prstGeom prst="rect">
+            <a:avLst/>
+          </a:prstGeom>
+        </p:spPr>
+      </p:pic>
+      <p:sp>
+        <p:nvSpPr>
+          <p:cNvPr id="21" name="Šrafovaná šipka doprava 10">
+            <a:extLst>
+              <a:ext uri="{FF2B5EF4-FFF2-40B4-BE49-F238E27FC236}">
+                <a16:creationId xmlns:a16="http://schemas.microsoft.com/office/drawing/2014/main" id="{56445BD4-8D82-4CA3-9EB6-81E40006DEE7}"/>
+              </a:ext>
+            </a:extLst>
+          </p:cNvPr>
+          <p:cNvSpPr/>
+          <p:nvPr/>
+        </p:nvSpPr>
+        <p:spPr>
+          <a:xfrm rot="20707871">
+            <a:off x="5022667" y="4131378"/>
+            <a:ext cx="973507" cy="360040"/>
+          </a:xfrm>
+          <a:prstGeom prst="stripedRightArrow">
+            <a:avLst/>
+          </a:prstGeom>
+        </p:spPr>
+        <p:style>
+          <a:lnRef idx="2">
+            <a:schemeClr val="accent1">
+              <a:shade val="50000"/>
+            </a:schemeClr>
+          </a:lnRef>
+          <a:fillRef idx="1">
+            <a:schemeClr val="accent1"/>
+          </a:fillRef>
+          <a:effectRef idx="0">
+            <a:schemeClr val="accent1"/>
+          </a:effectRef>
+          <a:fontRef idx="minor">
+            <a:schemeClr val="lt1"/>
+          </a:fontRef>
+        </p:style>
+        <p:txBody>
+          <a:bodyPr rtlCol="0" anchor="ctr"/>
+          <a:lstStyle/>
+          <a:p>
+            <a:pPr algn="ctr"/>
+            <a:endParaRPr lang="cs-CZ"/>
+          </a:p>
+        </p:txBody>
+      </p:sp>
     </p:spTree>
-    <p:extLst>
-      <p:ext uri="{BB962C8B-B14F-4D97-AF65-F5344CB8AC3E}">
-        <p14:creationId xmlns:p14="http://schemas.microsoft.com/office/powerpoint/2010/main" val="3174281765"/>
-      </p:ext>
-    </p:extLst>
   </p:cSld>
   <p:clrMapOvr>
     <a:masterClrMapping/>
@@ -5000,7 +7787,7 @@
 </p:sld>
 </file>
 
-<file path=ppt/slides/slide24.xml><?xml version="1.0" encoding="utf-8"?>
+<file path=ppt/slides/slide30.xml><?xml version="1.0" encoding="utf-8"?>
 <p:sld xmlns:a="http://schemas.openxmlformats.org/drawingml/2006/main" xmlns:r="http://schemas.openxmlformats.org/officeDocument/2006/relationships" xmlns:p="http://schemas.openxmlformats.org/presentationml/2006/main">
   <p:cSld>
     <p:spTree>
@@ -5110,7 +7897,7 @@
 </p:sld>
 </file>
 
-<file path=ppt/slides/slide25.xml><?xml version="1.0" encoding="utf-8"?>
+<file path=ppt/slides/slide31.xml><?xml version="1.0" encoding="utf-8"?>
 <p:sld xmlns:a="http://schemas.openxmlformats.org/drawingml/2006/main" xmlns:r="http://schemas.openxmlformats.org/officeDocument/2006/relationships" xmlns:p="http://schemas.openxmlformats.org/presentationml/2006/main">
   <p:cSld>
     <p:spTree>
@@ -5129,7 +7916,13 @@
       </p:grpSpPr>
       <p:sp>
         <p:nvSpPr>
-          <p:cNvPr id="2" name="Nadpis 1"/>
+          <p:cNvPr id="2" name="Title 1">
+            <a:extLst>
+              <a:ext uri="{FF2B5EF4-FFF2-40B4-BE49-F238E27FC236}">
+                <a16:creationId xmlns:a16="http://schemas.microsoft.com/office/drawing/2014/main" id="{C690D809-01C3-47D5-9ABB-1F24EC16394E}"/>
+              </a:ext>
+            </a:extLst>
+          </p:cNvPr>
           <p:cNvSpPr>
             <a:spLocks noGrp="1"/>
           </p:cNvSpPr>
@@ -5139,8 +7932,8 @@
         </p:nvSpPr>
         <p:spPr>
           <a:xfrm>
-            <a:off x="467544" y="1628800"/>
-            <a:ext cx="8229600" cy="1143000"/>
+            <a:off x="4551043" y="24543"/>
+            <a:ext cx="4546848" cy="1143000"/>
           </a:xfrm>
         </p:spPr>
         <p:txBody>
@@ -5149,44 +7942,137 @@
           <a:p>
             <a:r>
               <a:rPr lang="en-US" dirty="0"/>
-              <a:t>Thank you for your attention!</a:t>
+              <a:t>Blood medium</a:t>
             </a:r>
             <a:endParaRPr lang="cs-CZ" dirty="0"/>
           </a:p>
         </p:txBody>
       </p:sp>
-      <p:sp>
-        <p:nvSpPr>
-          <p:cNvPr id="3" name="Zástupný symbol pro obsah 2"/>
-          <p:cNvSpPr>
-            <a:spLocks noGrp="1"/>
-          </p:cNvSpPr>
+      <p:pic>
+        <p:nvPicPr>
+          <p:cNvPr id="5" name="Content Placeholder 4">
+            <a:extLst>
+              <a:ext uri="{FF2B5EF4-FFF2-40B4-BE49-F238E27FC236}">
+                <a16:creationId xmlns:a16="http://schemas.microsoft.com/office/drawing/2014/main" id="{12051FE6-D5E7-4733-AA07-1DC555C5DF42}"/>
+              </a:ext>
+            </a:extLst>
+          </p:cNvPr>
+          <p:cNvPicPr>
+            <a:picLocks noGrp="1" noChangeAspect="1"/>
+          </p:cNvPicPr>
           <p:nvPr>
             <p:ph idx="1"/>
           </p:nvPr>
-        </p:nvSpPr>
+        </p:nvPicPr>
+        <p:blipFill>
+          <a:blip r:embed="rId2"/>
+          <a:stretch>
+            <a:fillRect/>
+          </a:stretch>
+        </p:blipFill>
         <p:spPr>
           <a:xfrm>
-            <a:off x="5004048" y="6021288"/>
-            <a:ext cx="3898776" cy="604664"/>
+            <a:off x="46109" y="838961"/>
+            <a:ext cx="8229600" cy="2125702"/>
           </a:xfrm>
         </p:spPr>
-        <p:txBody>
-          <a:bodyPr/>
-          <a:lstStyle/>
-          <a:p>
-            <a:pPr>
-              <a:buNone/>
-            </a:pPr>
-            <a:r>
-              <a:rPr lang="en-US" dirty="0"/>
-              <a:t>www.physiolibrary.org</a:t>
-            </a:r>
-            <a:endParaRPr lang="cs-CZ" dirty="0"/>
-          </a:p>
-        </p:txBody>
-      </p:sp>
+      </p:pic>
+      <p:pic>
+        <p:nvPicPr>
+          <p:cNvPr id="7" name="Picture 6">
+            <a:extLst>
+              <a:ext uri="{FF2B5EF4-FFF2-40B4-BE49-F238E27FC236}">
+                <a16:creationId xmlns:a16="http://schemas.microsoft.com/office/drawing/2014/main" id="{FC3ED7D3-6445-4810-93E1-51AB3B59E2A3}"/>
+              </a:ext>
+            </a:extLst>
+          </p:cNvPr>
+          <p:cNvPicPr>
+            <a:picLocks noChangeAspect="1"/>
+          </p:cNvPicPr>
+          <p:nvPr/>
+        </p:nvPicPr>
+        <p:blipFill>
+          <a:blip r:embed="rId3"/>
+          <a:stretch>
+            <a:fillRect/>
+          </a:stretch>
+        </p:blipFill>
+        <p:spPr>
+          <a:xfrm>
+            <a:off x="0" y="4024588"/>
+            <a:ext cx="9144000" cy="2665195"/>
+          </a:xfrm>
+          <a:prstGeom prst="rect">
+            <a:avLst/>
+          </a:prstGeom>
+        </p:spPr>
+      </p:pic>
+      <p:pic>
+        <p:nvPicPr>
+          <p:cNvPr id="9" name="Picture 8">
+            <a:extLst>
+              <a:ext uri="{FF2B5EF4-FFF2-40B4-BE49-F238E27FC236}">
+                <a16:creationId xmlns:a16="http://schemas.microsoft.com/office/drawing/2014/main" id="{BD12766B-8AB0-4114-8BAB-9FC615755EB7}"/>
+              </a:ext>
+            </a:extLst>
+          </p:cNvPr>
+          <p:cNvPicPr>
+            <a:picLocks noChangeAspect="1"/>
+          </p:cNvPicPr>
+          <p:nvPr/>
+        </p:nvPicPr>
+        <p:blipFill>
+          <a:blip r:embed="rId4"/>
+          <a:stretch>
+            <a:fillRect/>
+          </a:stretch>
+        </p:blipFill>
+        <p:spPr>
+          <a:xfrm>
+            <a:off x="7372261" y="3952162"/>
+            <a:ext cx="1725630" cy="946188"/>
+          </a:xfrm>
+          <a:prstGeom prst="rect">
+            <a:avLst/>
+          </a:prstGeom>
+        </p:spPr>
+      </p:pic>
+      <p:pic>
+        <p:nvPicPr>
+          <p:cNvPr id="13" name="Picture 12">
+            <a:extLst>
+              <a:ext uri="{FF2B5EF4-FFF2-40B4-BE49-F238E27FC236}">
+                <a16:creationId xmlns:a16="http://schemas.microsoft.com/office/drawing/2014/main" id="{4294F9BF-075D-47CF-A862-9E6C0F84D3BB}"/>
+              </a:ext>
+            </a:extLst>
+          </p:cNvPr>
+          <p:cNvPicPr>
+            <a:picLocks noChangeAspect="1"/>
+          </p:cNvPicPr>
+          <p:nvPr/>
+        </p:nvPicPr>
+        <p:blipFill>
+          <a:blip r:embed="rId5"/>
+          <a:stretch>
+            <a:fillRect/>
+          </a:stretch>
+        </p:blipFill>
+        <p:spPr>
+          <a:xfrm>
+            <a:off x="3779912" y="2416630"/>
+            <a:ext cx="5257416" cy="1240918"/>
+          </a:xfrm>
+          <a:prstGeom prst="rect">
+            <a:avLst/>
+          </a:prstGeom>
+        </p:spPr>
+      </p:pic>
     </p:spTree>
+    <p:extLst>
+      <p:ext uri="{BB962C8B-B14F-4D97-AF65-F5344CB8AC3E}">
+        <p14:creationId xmlns:p14="http://schemas.microsoft.com/office/powerpoint/2010/main" val="3341798206"/>
+      </p:ext>
+    </p:extLst>
   </p:cSld>
   <p:clrMapOvr>
     <a:masterClrMapping/>
@@ -5194,7 +8080,7 @@
 </p:sld>
 </file>
 
-<file path=ppt/slides/slide3.xml><?xml version="1.0" encoding="utf-8"?>
+<file path=ppt/slides/slide32.xml><?xml version="1.0" encoding="utf-8"?>
 <p:sld xmlns:a="http://schemas.openxmlformats.org/drawingml/2006/main" xmlns:r="http://schemas.openxmlformats.org/officeDocument/2006/relationships" xmlns:p="http://schemas.openxmlformats.org/presentationml/2006/main">
   <p:cSld>
     <p:spTree>
@@ -5213,7 +8099,13 @@
       </p:grpSpPr>
       <p:sp>
         <p:nvSpPr>
-          <p:cNvPr id="2" name="Nadpis 1"/>
+          <p:cNvPr id="2" name="Title 1">
+            <a:extLst>
+              <a:ext uri="{FF2B5EF4-FFF2-40B4-BE49-F238E27FC236}">
+                <a16:creationId xmlns:a16="http://schemas.microsoft.com/office/drawing/2014/main" id="{D210F4EF-4A7A-4F37-964B-6CEEEA09E782}"/>
+              </a:ext>
+            </a:extLst>
+          </p:cNvPr>
           <p:cNvSpPr>
             <a:spLocks noGrp="1"/>
           </p:cNvSpPr>
@@ -5221,56 +8113,139 @@
             <p:ph type="title"/>
           </p:nvPr>
         </p:nvSpPr>
-        <p:spPr/>
-        <p:txBody>
-          <a:bodyPr/>
-          <a:lstStyle/>
-          <a:p>
-            <a:r>
-              <a:rPr lang="en-US" dirty="0"/>
-              <a:t>Physiolibrary Structure</a:t>
+        <p:spPr>
+          <a:xfrm>
+            <a:off x="1763688" y="274638"/>
+            <a:ext cx="6923112" cy="1143000"/>
+          </a:xfrm>
+        </p:spPr>
+        <p:txBody>
+          <a:bodyPr/>
+          <a:lstStyle/>
+          <a:p>
+            <a:r>
+              <a:rPr lang="en-US" dirty="0" err="1"/>
+              <a:t>SubstancesPort</a:t>
             </a:r>
             <a:endParaRPr lang="cs-CZ" dirty="0"/>
           </a:p>
         </p:txBody>
       </p:sp>
-      <p:sp>
-        <p:nvSpPr>
-          <p:cNvPr id="11" name="Šrafovaná šipka doprava 10"/>
-          <p:cNvSpPr/>
+      <p:pic>
+        <p:nvPicPr>
+          <p:cNvPr id="7" name="Content Placeholder 6">
+            <a:extLst>
+              <a:ext uri="{FF2B5EF4-FFF2-40B4-BE49-F238E27FC236}">
+                <a16:creationId xmlns:a16="http://schemas.microsoft.com/office/drawing/2014/main" id="{5B65B38E-BAA8-4590-BCAC-3129DCD6E2DB}"/>
+              </a:ext>
+            </a:extLst>
+          </p:cNvPr>
+          <p:cNvPicPr>
+            <a:picLocks noGrp="1" noChangeAspect="1"/>
+          </p:cNvPicPr>
+          <p:nvPr>
+            <p:ph idx="1"/>
+          </p:nvPr>
+        </p:nvPicPr>
+        <p:blipFill>
+          <a:blip r:embed="rId2"/>
+          <a:stretch>
+            <a:fillRect/>
+          </a:stretch>
+        </p:blipFill>
+        <p:spPr>
+          <a:xfrm>
+            <a:off x="3160645" y="2276872"/>
+            <a:ext cx="5785535" cy="3847159"/>
+          </a:xfrm>
+        </p:spPr>
+      </p:pic>
+      <p:pic>
+        <p:nvPicPr>
+          <p:cNvPr id="5" name="Picture 4">
+            <a:extLst>
+              <a:ext uri="{FF2B5EF4-FFF2-40B4-BE49-F238E27FC236}">
+                <a16:creationId xmlns:a16="http://schemas.microsoft.com/office/drawing/2014/main" id="{DFE9832C-F171-4533-BF67-300CB87BC87E}"/>
+              </a:ext>
+            </a:extLst>
+          </p:cNvPr>
+          <p:cNvPicPr>
+            <a:picLocks noChangeAspect="1"/>
+          </p:cNvPicPr>
           <p:nvPr/>
-        </p:nvSpPr>
+        </p:nvPicPr>
+        <p:blipFill>
+          <a:blip r:embed="rId3"/>
+          <a:stretch>
+            <a:fillRect/>
+          </a:stretch>
+        </p:blipFill>
         <p:spPr>
-          <a:xfrm rot="20707871">
-            <a:off x="2718798" y="3126597"/>
-            <a:ext cx="973507" cy="360040"/>
+          <a:xfrm>
+            <a:off x="107504" y="490127"/>
+            <a:ext cx="3000794" cy="5877745"/>
           </a:xfrm>
-          <a:prstGeom prst="stripedRightArrow">
+          <a:prstGeom prst="rect">
             <a:avLst/>
           </a:prstGeom>
         </p:spPr>
-        <p:style>
-          <a:lnRef idx="2">
-            <a:schemeClr val="accent1">
-              <a:shade val="50000"/>
-            </a:schemeClr>
-          </a:lnRef>
-          <a:fillRef idx="1">
-            <a:schemeClr val="accent1"/>
-          </a:fillRef>
-          <a:effectRef idx="0">
-            <a:schemeClr val="accent1"/>
-          </a:effectRef>
-          <a:fontRef idx="minor">
-            <a:schemeClr val="lt1"/>
-          </a:fontRef>
-        </p:style>
-        <p:txBody>
-          <a:bodyPr rtlCol="0" anchor="ctr"/>
-          <a:lstStyle/>
-          <a:p>
-            <a:pPr algn="ctr"/>
-            <a:endParaRPr lang="cs-CZ"/>
+      </p:pic>
+    </p:spTree>
+    <p:extLst>
+      <p:ext uri="{BB962C8B-B14F-4D97-AF65-F5344CB8AC3E}">
+        <p14:creationId xmlns:p14="http://schemas.microsoft.com/office/powerpoint/2010/main" val="393053835"/>
+      </p:ext>
+    </p:extLst>
+  </p:cSld>
+  <p:clrMapOvr>
+    <a:masterClrMapping/>
+  </p:clrMapOvr>
+</p:sld>
+</file>
+
+<file path=ppt/slides/slide33.xml><?xml version="1.0" encoding="utf-8"?>
+<p:sld xmlns:a="http://schemas.openxmlformats.org/drawingml/2006/main" xmlns:r="http://schemas.openxmlformats.org/officeDocument/2006/relationships" xmlns:p="http://schemas.openxmlformats.org/presentationml/2006/main">
+  <p:cSld>
+    <p:spTree>
+      <p:nvGrpSpPr>
+        <p:cNvPr id="1" name=""/>
+        <p:cNvGrpSpPr/>
+        <p:nvPr/>
+      </p:nvGrpSpPr>
+      <p:grpSpPr>
+        <a:xfrm>
+          <a:off x="0" y="0"/>
+          <a:ext cx="0" cy="0"/>
+          <a:chOff x="0" y="0"/>
+          <a:chExt cx="0" cy="0"/>
+        </a:xfrm>
+      </p:grpSpPr>
+      <p:sp>
+        <p:nvSpPr>
+          <p:cNvPr id="2" name="Title 1">
+            <a:extLst>
+              <a:ext uri="{FF2B5EF4-FFF2-40B4-BE49-F238E27FC236}">
+                <a16:creationId xmlns:a16="http://schemas.microsoft.com/office/drawing/2014/main" id="{595BC449-B43A-47E6-9996-C540A8B3A649}"/>
+              </a:ext>
+            </a:extLst>
+          </p:cNvPr>
+          <p:cNvSpPr>
+            <a:spLocks noGrp="1"/>
+          </p:cNvSpPr>
+          <p:nvPr>
+            <p:ph type="title"/>
+          </p:nvPr>
+        </p:nvSpPr>
+        <p:spPr/>
+        <p:txBody>
+          <a:bodyPr/>
+          <a:lstStyle/>
+          <a:p>
+            <a:r>
+              <a:rPr lang="en-US" dirty="0"/>
+              <a:t>Blood  - setting</a:t>
+            </a:r>
+            <a:endParaRPr lang="cs-CZ" dirty="0"/>
           </a:p>
         </p:txBody>
       </p:sp>
@@ -5279,7 +8254,7 @@
           <p:cNvPr id="5" name="Picture 4">
             <a:extLst>
               <a:ext uri="{FF2B5EF4-FFF2-40B4-BE49-F238E27FC236}">
-                <a16:creationId xmlns:a16="http://schemas.microsoft.com/office/drawing/2014/main" id="{6B72E9B1-8E34-4C92-8404-FCFD12F23E8C}"/>
+                <a16:creationId xmlns:a16="http://schemas.microsoft.com/office/drawing/2014/main" id="{D3382BAB-9DA5-4D80-AF91-F9ABAEC9EA42}"/>
               </a:ext>
             </a:extLst>
           </p:cNvPr>
@@ -5296,8 +8271,8 @@
         </p:blipFill>
         <p:spPr>
           <a:xfrm>
-            <a:off x="1107531" y="2721485"/>
-            <a:ext cx="1581371" cy="2943636"/>
+            <a:off x="5933691" y="1377242"/>
+            <a:ext cx="2753109" cy="724001"/>
           </a:xfrm>
           <a:prstGeom prst="rect">
             <a:avLst/>
@@ -5306,10 +8281,10 @@
       </p:pic>
       <p:pic>
         <p:nvPicPr>
-          <p:cNvPr id="7" name="Picture 6">
-            <a:extLst>
-              <a:ext uri="{FF2B5EF4-FFF2-40B4-BE49-F238E27FC236}">
-                <a16:creationId xmlns:a16="http://schemas.microsoft.com/office/drawing/2014/main" id="{76E70474-AD66-47DF-93CF-2E4629241D61}"/>
+          <p:cNvPr id="9" name="Picture 8">
+            <a:extLst>
+              <a:ext uri="{FF2B5EF4-FFF2-40B4-BE49-F238E27FC236}">
+                <a16:creationId xmlns:a16="http://schemas.microsoft.com/office/drawing/2014/main" id="{3CC6D432-7695-4231-8A78-031D1F64BDDD}"/>
               </a:ext>
             </a:extLst>
           </p:cNvPr>
@@ -5326,66 +8301,20 @@
         </p:blipFill>
         <p:spPr>
           <a:xfrm>
-            <a:off x="3767025" y="1700808"/>
-            <a:ext cx="1609950" cy="2181529"/>
+            <a:off x="1217" y="2204864"/>
+            <a:ext cx="9144000" cy="4752056"/>
           </a:xfrm>
           <a:prstGeom prst="rect">
             <a:avLst/>
           </a:prstGeom>
         </p:spPr>
       </p:pic>
-      <p:sp>
-        <p:nvSpPr>
-          <p:cNvPr id="12" name="Šrafovaná šipka doprava 10">
-            <a:extLst>
-              <a:ext uri="{FF2B5EF4-FFF2-40B4-BE49-F238E27FC236}">
-                <a16:creationId xmlns:a16="http://schemas.microsoft.com/office/drawing/2014/main" id="{686F25E8-A318-4BAE-9C97-9D15853554BF}"/>
-              </a:ext>
-            </a:extLst>
-          </p:cNvPr>
-          <p:cNvSpPr/>
-          <p:nvPr/>
-        </p:nvSpPr>
-        <p:spPr>
-          <a:xfrm rot="2564001">
-            <a:off x="2723458" y="3772833"/>
-            <a:ext cx="648072" cy="360040"/>
-          </a:xfrm>
-          <a:prstGeom prst="stripedRightArrow">
-            <a:avLst/>
-          </a:prstGeom>
-        </p:spPr>
-        <p:style>
-          <a:lnRef idx="2">
-            <a:schemeClr val="accent1">
-              <a:shade val="50000"/>
-            </a:schemeClr>
-          </a:lnRef>
-          <a:fillRef idx="1">
-            <a:schemeClr val="accent1"/>
-          </a:fillRef>
-          <a:effectRef idx="0">
-            <a:schemeClr val="accent1"/>
-          </a:effectRef>
-          <a:fontRef idx="minor">
-            <a:schemeClr val="lt1"/>
-          </a:fontRef>
-        </p:style>
-        <p:txBody>
-          <a:bodyPr rtlCol="0" anchor="ctr"/>
-          <a:lstStyle/>
-          <a:p>
-            <a:pPr algn="ctr"/>
-            <a:endParaRPr lang="cs-CZ"/>
-          </a:p>
-        </p:txBody>
-      </p:sp>
       <p:pic>
         <p:nvPicPr>
-          <p:cNvPr id="10" name="Picture 9">
-            <a:extLst>
-              <a:ext uri="{FF2B5EF4-FFF2-40B4-BE49-F238E27FC236}">
-                <a16:creationId xmlns:a16="http://schemas.microsoft.com/office/drawing/2014/main" id="{2A3CD6B5-ED8D-4553-B2FD-B2943385B8DB}"/>
+          <p:cNvPr id="17" name="Picture 16">
+            <a:extLst>
+              <a:ext uri="{FF2B5EF4-FFF2-40B4-BE49-F238E27FC236}">
+                <a16:creationId xmlns:a16="http://schemas.microsoft.com/office/drawing/2014/main" id="{7F7BA38B-2962-406C-9203-D300DA94CB7D}"/>
               </a:ext>
             </a:extLst>
           </p:cNvPr>
@@ -5402,8 +8331,126 @@
         </p:blipFill>
         <p:spPr>
           <a:xfrm>
-            <a:off x="3520402" y="4012501"/>
-            <a:ext cx="1467055" cy="1581371"/>
+            <a:off x="457200" y="519873"/>
+            <a:ext cx="1467055" cy="1219370"/>
+          </a:xfrm>
+          <a:prstGeom prst="rect">
+            <a:avLst/>
+          </a:prstGeom>
+        </p:spPr>
+      </p:pic>
+    </p:spTree>
+    <p:extLst>
+      <p:ext uri="{BB962C8B-B14F-4D97-AF65-F5344CB8AC3E}">
+        <p14:creationId xmlns:p14="http://schemas.microsoft.com/office/powerpoint/2010/main" val="1752931590"/>
+      </p:ext>
+    </p:extLst>
+  </p:cSld>
+  <p:clrMapOvr>
+    <a:masterClrMapping/>
+  </p:clrMapOvr>
+</p:sld>
+</file>
+
+<file path=ppt/slides/slide34.xml><?xml version="1.0" encoding="utf-8"?>
+<p:sld xmlns:a="http://schemas.openxmlformats.org/drawingml/2006/main" xmlns:r="http://schemas.openxmlformats.org/officeDocument/2006/relationships" xmlns:p="http://schemas.openxmlformats.org/presentationml/2006/main">
+  <p:cSld>
+    <p:spTree>
+      <p:nvGrpSpPr>
+        <p:cNvPr id="1" name=""/>
+        <p:cNvGrpSpPr/>
+        <p:nvPr/>
+      </p:nvGrpSpPr>
+      <p:grpSpPr>
+        <a:xfrm>
+          <a:off x="0" y="0"/>
+          <a:ext cx="0" cy="0"/>
+          <a:chOff x="0" y="0"/>
+          <a:chExt cx="0" cy="0"/>
+        </a:xfrm>
+      </p:grpSpPr>
+      <p:sp>
+        <p:nvSpPr>
+          <p:cNvPr id="2" name="Title 1">
+            <a:extLst>
+              <a:ext uri="{FF2B5EF4-FFF2-40B4-BE49-F238E27FC236}">
+                <a16:creationId xmlns:a16="http://schemas.microsoft.com/office/drawing/2014/main" id="{DDEF12C2-191B-4775-8F7D-044F2F9A382B}"/>
+              </a:ext>
+            </a:extLst>
+          </p:cNvPr>
+          <p:cNvSpPr>
+            <a:spLocks noGrp="1"/>
+          </p:cNvSpPr>
+          <p:nvPr>
+            <p:ph type="title"/>
+          </p:nvPr>
+        </p:nvSpPr>
+        <p:spPr/>
+        <p:txBody>
+          <a:bodyPr/>
+          <a:lstStyle/>
+          <a:p>
+            <a:r>
+              <a:rPr lang="en-US" dirty="0"/>
+              <a:t>Blood - output</a:t>
+            </a:r>
+            <a:endParaRPr lang="cs-CZ" b="1" dirty="0"/>
+          </a:p>
+        </p:txBody>
+      </p:sp>
+      <p:pic>
+        <p:nvPicPr>
+          <p:cNvPr id="5" name="Content Placeholder 4">
+            <a:extLst>
+              <a:ext uri="{FF2B5EF4-FFF2-40B4-BE49-F238E27FC236}">
+                <a16:creationId xmlns:a16="http://schemas.microsoft.com/office/drawing/2014/main" id="{21872B4F-529E-48A7-8604-22D811F851AC}"/>
+              </a:ext>
+            </a:extLst>
+          </p:cNvPr>
+          <p:cNvPicPr>
+            <a:picLocks noGrp="1" noChangeAspect="1"/>
+          </p:cNvPicPr>
+          <p:nvPr>
+            <p:ph idx="1"/>
+          </p:nvPr>
+        </p:nvPicPr>
+        <p:blipFill>
+          <a:blip r:embed="rId2"/>
+          <a:stretch>
+            <a:fillRect/>
+          </a:stretch>
+        </p:blipFill>
+        <p:spPr>
+          <a:xfrm>
+            <a:off x="79649" y="2743412"/>
+            <a:ext cx="5719096" cy="685588"/>
+          </a:xfrm>
+        </p:spPr>
+      </p:pic>
+      <p:pic>
+        <p:nvPicPr>
+          <p:cNvPr id="11" name="Picture 10">
+            <a:extLst>
+              <a:ext uri="{FF2B5EF4-FFF2-40B4-BE49-F238E27FC236}">
+                <a16:creationId xmlns:a16="http://schemas.microsoft.com/office/drawing/2014/main" id="{ED5347BB-E188-4C94-AE21-F59B16015D7B}"/>
+              </a:ext>
+            </a:extLst>
+          </p:cNvPr>
+          <p:cNvPicPr>
+            <a:picLocks noChangeAspect="1"/>
+          </p:cNvPicPr>
+          <p:nvPr/>
+        </p:nvPicPr>
+        <p:blipFill>
+          <a:blip r:embed="rId3"/>
+          <a:stretch>
+            <a:fillRect/>
+          </a:stretch>
+        </p:blipFill>
+        <p:spPr>
+          <a:xfrm>
+            <a:off x="96954" y="1322667"/>
+            <a:ext cx="5718018" cy="951909"/>
           </a:xfrm>
           <a:prstGeom prst="rect">
             <a:avLst/>
@@ -5412,10 +8459,40 @@
       </p:pic>
       <p:pic>
         <p:nvPicPr>
-          <p:cNvPr id="18" name="Picture 17">
-            <a:extLst>
-              <a:ext uri="{FF2B5EF4-FFF2-40B4-BE49-F238E27FC236}">
-                <a16:creationId xmlns:a16="http://schemas.microsoft.com/office/drawing/2014/main" id="{5C3EE3D1-5000-46B0-BC0F-31461F6A6117}"/>
+          <p:cNvPr id="13" name="Picture 12">
+            <a:extLst>
+              <a:ext uri="{FF2B5EF4-FFF2-40B4-BE49-F238E27FC236}">
+                <a16:creationId xmlns:a16="http://schemas.microsoft.com/office/drawing/2014/main" id="{9A2A0128-FBFD-4214-9C4C-078186549B0E}"/>
+              </a:ext>
+            </a:extLst>
+          </p:cNvPr>
+          <p:cNvPicPr>
+            <a:picLocks noChangeAspect="1"/>
+          </p:cNvPicPr>
+          <p:nvPr/>
+        </p:nvPicPr>
+        <p:blipFill>
+          <a:blip r:embed="rId4"/>
+          <a:stretch>
+            <a:fillRect/>
+          </a:stretch>
+        </p:blipFill>
+        <p:spPr>
+          <a:xfrm>
+            <a:off x="4742900" y="4024963"/>
+            <a:ext cx="3943900" cy="2819794"/>
+          </a:xfrm>
+          <a:prstGeom prst="rect">
+            <a:avLst/>
+          </a:prstGeom>
+        </p:spPr>
+      </p:pic>
+      <p:pic>
+        <p:nvPicPr>
+          <p:cNvPr id="15" name="Picture 14">
+            <a:extLst>
+              <a:ext uri="{FF2B5EF4-FFF2-40B4-BE49-F238E27FC236}">
+                <a16:creationId xmlns:a16="http://schemas.microsoft.com/office/drawing/2014/main" id="{A14B9124-C55E-4B4E-A61F-28ACECB6F08B}"/>
               </a:ext>
             </a:extLst>
           </p:cNvPr>
@@ -5432,57 +8509,160 @@
         </p:blipFill>
         <p:spPr>
           <a:xfrm>
-            <a:off x="6228184" y="2575939"/>
-            <a:ext cx="2019582" cy="3458058"/>
+            <a:off x="974671" y="4029434"/>
+            <a:ext cx="3261912" cy="2828566"/>
           </a:xfrm>
           <a:prstGeom prst="rect">
             <a:avLst/>
           </a:prstGeom>
         </p:spPr>
       </p:pic>
-      <p:sp>
-        <p:nvSpPr>
-          <p:cNvPr id="21" name="Šrafovaná šipka doprava 10">
-            <a:extLst>
-              <a:ext uri="{FF2B5EF4-FFF2-40B4-BE49-F238E27FC236}">
-                <a16:creationId xmlns:a16="http://schemas.microsoft.com/office/drawing/2014/main" id="{56445BD4-8D82-4CA3-9EB6-81E40006DEE7}"/>
-              </a:ext>
-            </a:extLst>
-          </p:cNvPr>
-          <p:cNvSpPr/>
+      <p:pic>
+        <p:nvPicPr>
+          <p:cNvPr id="17" name="Picture 16">
+            <a:extLst>
+              <a:ext uri="{FF2B5EF4-FFF2-40B4-BE49-F238E27FC236}">
+                <a16:creationId xmlns:a16="http://schemas.microsoft.com/office/drawing/2014/main" id="{496C6F13-000E-46D4-A15C-0C35FAE39512}"/>
+              </a:ext>
+            </a:extLst>
+          </p:cNvPr>
+          <p:cNvPicPr>
+            <a:picLocks noChangeAspect="1"/>
+          </p:cNvPicPr>
           <p:nvPr/>
-        </p:nvSpPr>
+        </p:nvPicPr>
+        <p:blipFill>
+          <a:blip r:embed="rId6"/>
+          <a:stretch>
+            <a:fillRect/>
+          </a:stretch>
+        </p:blipFill>
         <p:spPr>
-          <a:xfrm rot="20707871">
-            <a:off x="5022667" y="4131378"/>
-            <a:ext cx="973507" cy="360040"/>
+          <a:xfrm>
+            <a:off x="5771808" y="1289916"/>
+            <a:ext cx="3254953" cy="986540"/>
           </a:xfrm>
-          <a:prstGeom prst="stripedRightArrow">
+          <a:prstGeom prst="rect">
             <a:avLst/>
           </a:prstGeom>
         </p:spPr>
-        <p:style>
-          <a:lnRef idx="2">
-            <a:schemeClr val="accent1">
-              <a:shade val="50000"/>
-            </a:schemeClr>
-          </a:lnRef>
-          <a:fillRef idx="1">
-            <a:schemeClr val="accent1"/>
-          </a:fillRef>
-          <a:effectRef idx="0">
-            <a:schemeClr val="accent1"/>
-          </a:effectRef>
-          <a:fontRef idx="minor">
-            <a:schemeClr val="lt1"/>
-          </a:fontRef>
-        </p:style>
-        <p:txBody>
-          <a:bodyPr rtlCol="0" anchor="ctr"/>
-          <a:lstStyle/>
-          <a:p>
-            <a:pPr algn="ctr"/>
-            <a:endParaRPr lang="cs-CZ"/>
+      </p:pic>
+      <p:pic>
+        <p:nvPicPr>
+          <p:cNvPr id="19" name="Picture 18">
+            <a:extLst>
+              <a:ext uri="{FF2B5EF4-FFF2-40B4-BE49-F238E27FC236}">
+                <a16:creationId xmlns:a16="http://schemas.microsoft.com/office/drawing/2014/main" id="{01B01A41-B5BF-4D2F-A84D-6F3C1562E876}"/>
+              </a:ext>
+            </a:extLst>
+          </p:cNvPr>
+          <p:cNvPicPr>
+            <a:picLocks noChangeAspect="1"/>
+          </p:cNvPicPr>
+          <p:nvPr/>
+        </p:nvPicPr>
+        <p:blipFill>
+          <a:blip r:embed="rId7"/>
+          <a:stretch>
+            <a:fillRect/>
+          </a:stretch>
+        </p:blipFill>
+        <p:spPr>
+          <a:xfrm>
+            <a:off x="5851112" y="2555379"/>
+            <a:ext cx="3096344" cy="754571"/>
+          </a:xfrm>
+          <a:prstGeom prst="rect">
+            <a:avLst/>
+          </a:prstGeom>
+        </p:spPr>
+      </p:pic>
+    </p:spTree>
+    <p:extLst>
+      <p:ext uri="{BB962C8B-B14F-4D97-AF65-F5344CB8AC3E}">
+        <p14:creationId xmlns:p14="http://schemas.microsoft.com/office/powerpoint/2010/main" val="225711093"/>
+      </p:ext>
+    </p:extLst>
+  </p:cSld>
+  <p:clrMapOvr>
+    <a:masterClrMapping/>
+  </p:clrMapOvr>
+</p:sld>
+</file>
+
+<file path=ppt/slides/slide35.xml><?xml version="1.0" encoding="utf-8"?>
+<p:sld xmlns:a="http://schemas.openxmlformats.org/drawingml/2006/main" xmlns:r="http://schemas.openxmlformats.org/officeDocument/2006/relationships" xmlns:p="http://schemas.openxmlformats.org/presentationml/2006/main">
+  <p:cSld>
+    <p:spTree>
+      <p:nvGrpSpPr>
+        <p:cNvPr id="1" name=""/>
+        <p:cNvGrpSpPr/>
+        <p:nvPr/>
+      </p:nvGrpSpPr>
+      <p:grpSpPr>
+        <a:xfrm>
+          <a:off x="0" y="0"/>
+          <a:ext cx="0" cy="0"/>
+          <a:chOff x="0" y="0"/>
+          <a:chExt cx="0" cy="0"/>
+        </a:xfrm>
+      </p:grpSpPr>
+      <p:sp>
+        <p:nvSpPr>
+          <p:cNvPr id="2" name="Nadpis 1"/>
+          <p:cNvSpPr>
+            <a:spLocks noGrp="1"/>
+          </p:cNvSpPr>
+          <p:nvPr>
+            <p:ph type="title"/>
+          </p:nvPr>
+        </p:nvSpPr>
+        <p:spPr>
+          <a:xfrm>
+            <a:off x="467544" y="1628800"/>
+            <a:ext cx="8229600" cy="1143000"/>
+          </a:xfrm>
+        </p:spPr>
+        <p:txBody>
+          <a:bodyPr/>
+          <a:lstStyle/>
+          <a:p>
+            <a:r>
+              <a:rPr lang="en-US" dirty="0"/>
+              <a:t>Thank you for your attention!</a:t>
+            </a:r>
+            <a:endParaRPr lang="cs-CZ" dirty="0"/>
+          </a:p>
+        </p:txBody>
+      </p:sp>
+      <p:sp>
+        <p:nvSpPr>
+          <p:cNvPr id="3" name="Zástupný symbol pro obsah 2"/>
+          <p:cNvSpPr>
+            <a:spLocks noGrp="1"/>
+          </p:cNvSpPr>
+          <p:nvPr>
+            <p:ph idx="1"/>
+          </p:nvPr>
+        </p:nvSpPr>
+        <p:spPr>
+          <a:xfrm>
+            <a:off x="5004048" y="6021288"/>
+            <a:ext cx="3898776" cy="604664"/>
+          </a:xfrm>
+        </p:spPr>
+        <p:txBody>
+          <a:bodyPr/>
+          <a:lstStyle/>
+          <a:p>
+            <a:pPr>
+              <a:buNone/>
+            </a:pPr>
+            <a:r>
+              <a:rPr lang="en-US" dirty="0"/>
+              <a:t>www.physiolibrary.org</a:t>
+            </a:r>
+            <a:endParaRPr lang="cs-CZ" dirty="0"/>
           </a:p>
         </p:txBody>
       </p:sp>

</xml_diff>